<commit_message>
Final edits on ppt, InstallMe, etc
</commit_message>
<xml_diff>
--- a/dapr-proxy-service-invocation/Using the Dapr Proxy for Service Invocation.pptx
+++ b/dapr-proxy-service-invocation/Using the Dapr Proxy for Service Invocation.pptx
@@ -326,7 +326,7 @@
           <a:p>
             <a:fld id="{CFC37855-D03C-49F4-B68F-729DF42794A3}" type="datetimeFigureOut">
               <a:rPr lang="en-US" smtClean="0"/>
-              <a:t>12/29/2022</a:t>
+              <a:t>12/31/2022</a:t>
             </a:fld>
             <a:endParaRPr lang="en-US"/>
           </a:p>
@@ -679,7 +679,7 @@
           <a:p>
             <a:fld id="{CFC37855-D03C-49F4-B68F-729DF42794A3}" type="datetimeFigureOut">
               <a:rPr lang="en-US" smtClean="0"/>
-              <a:t>12/29/2022</a:t>
+              <a:t>12/31/2022</a:t>
             </a:fld>
             <a:endParaRPr lang="en-US"/>
           </a:p>
@@ -854,7 +854,7 @@
           <a:p>
             <a:fld id="{CFC37855-D03C-49F4-B68F-729DF42794A3}" type="datetimeFigureOut">
               <a:rPr lang="en-US" smtClean="0"/>
-              <a:t>12/29/2022</a:t>
+              <a:t>12/31/2022</a:t>
             </a:fld>
             <a:endParaRPr lang="en-US"/>
           </a:p>
@@ -967,7 +967,7 @@
           <a:p>
             <a:fld id="{CFC37855-D03C-49F4-B68F-729DF42794A3}" type="datetimeFigureOut">
               <a:rPr lang="en-US" smtClean="0"/>
-              <a:t>12/29/2022</a:t>
+              <a:t>12/31/2022</a:t>
             </a:fld>
             <a:endParaRPr lang="en-US"/>
           </a:p>
@@ -1325,7 +1325,7 @@
           <a:p>
             <a:fld id="{CFC37855-D03C-49F4-B68F-729DF42794A3}" type="datetimeFigureOut">
               <a:rPr lang="en-US" smtClean="0"/>
-              <a:t>12/29/2022</a:t>
+              <a:t>12/31/2022</a:t>
             </a:fld>
             <a:endParaRPr lang="en-US"/>
           </a:p>
@@ -1590,7 +1590,7 @@
           <a:p>
             <a:fld id="{CFC37855-D03C-49F4-B68F-729DF42794A3}" type="datetimeFigureOut">
               <a:rPr lang="en-US" smtClean="0"/>
-              <a:t>12/29/2022</a:t>
+              <a:t>12/31/2022</a:t>
             </a:fld>
             <a:endParaRPr lang="en-US"/>
           </a:p>
@@ -1952,7 +1952,7 @@
           <a:p>
             <a:fld id="{CFC37855-D03C-49F4-B68F-729DF42794A3}" type="datetimeFigureOut">
               <a:rPr lang="en-US" smtClean="0"/>
-              <a:t>12/29/2022</a:t>
+              <a:t>12/31/2022</a:t>
             </a:fld>
             <a:endParaRPr lang="en-US"/>
           </a:p>
@@ -2179,7 +2179,7 @@
           <a:p>
             <a:fld id="{CFC37855-D03C-49F4-B68F-729DF42794A3}" type="datetimeFigureOut">
               <a:rPr lang="en-US" smtClean="0"/>
-              <a:t>12/29/2022</a:t>
+              <a:t>12/31/2022</a:t>
             </a:fld>
             <a:endParaRPr lang="en-US"/>
           </a:p>
@@ -2269,7 +2269,7 @@
           <a:p>
             <a:fld id="{CFC37855-D03C-49F4-B68F-729DF42794A3}" type="datetimeFigureOut">
               <a:rPr lang="en-US" smtClean="0"/>
-              <a:t>12/29/2022</a:t>
+              <a:t>12/31/2022</a:t>
             </a:fld>
             <a:endParaRPr lang="en-US"/>
           </a:p>
@@ -2536,7 +2536,7 @@
           <a:p>
             <a:fld id="{CFC37855-D03C-49F4-B68F-729DF42794A3}" type="datetimeFigureOut">
               <a:rPr lang="en-US" smtClean="0"/>
-              <a:t>12/29/2022</a:t>
+              <a:t>12/31/2022</a:t>
             </a:fld>
             <a:endParaRPr lang="en-US"/>
           </a:p>
@@ -2764,7 +2764,7 @@
           <a:p>
             <a:fld id="{CFC37855-D03C-49F4-B68F-729DF42794A3}" type="datetimeFigureOut">
               <a:rPr lang="en-US" smtClean="0"/>
-              <a:t>12/29/2022</a:t>
+              <a:t>12/31/2022</a:t>
             </a:fld>
             <a:endParaRPr lang="en-US"/>
           </a:p>
@@ -3263,7 +3263,7 @@
           <a:p>
             <a:fld id="{CFC37855-D03C-49F4-B68F-729DF42794A3}" type="datetimeFigureOut">
               <a:rPr lang="en-US" smtClean="0"/>
-              <a:t>12/29/2022</a:t>
+              <a:t>12/31/2022</a:t>
             </a:fld>
             <a:endParaRPr lang="en-US"/>
           </a:p>
@@ -3698,8 +3698,9 @@
           <a:p>
             <a:r>
               <a:rPr lang="en-US" sz="1800" dirty="0" smtClean="0"/>
-              <a:t>12/28/22</a:t>
-            </a:r>
+              <a:t>12/31/22</a:t>
+            </a:r>
+            <a:endParaRPr lang="en-US" sz="1800" dirty="0" smtClean="0"/>
           </a:p>
           <a:p>
             <a:r>
@@ -4072,7 +4073,6 @@
               <a:rPr lang="en-US" sz="1800" dirty="0" smtClean="0"/>
               <a:t>response. </a:t>
             </a:r>
-            <a:endParaRPr lang="en-US" sz="1800" dirty="0" smtClean="0"/>
           </a:p>
           <a:p>
             <a:pPr lvl="1"/>
@@ -5638,15 +5638,7 @@
           <a:p>
             <a:r>
               <a:rPr lang="en-US" sz="1900" dirty="0" smtClean="0"/>
-              <a:t>Before looking at a detailed version of the above </a:t>
-            </a:r>
-            <a:r>
-              <a:rPr lang="en-US" sz="1900" dirty="0" smtClean="0"/>
-              <a:t>diagram that shows </a:t>
-            </a:r>
-            <a:r>
-              <a:rPr lang="en-US" sz="1900" dirty="0" smtClean="0"/>
-              <a:t>which ports are used where, below are the Dapr Run commands that launch WebAPI1 and ServiceA in </a:t>
+              <a:t>Before looking at a detailed version of the above diagram that shows which ports are used where, below are the Dapr Run commands that launch WebAPI1 and ServiceA in </a:t>
             </a:r>
             <a:r>
               <a:rPr lang="en-US" sz="1900" dirty="0" err="1" smtClean="0"/>
@@ -5682,7 +5674,6 @@
               <a:rPr lang="en-US" sz="1900" dirty="0" smtClean="0"/>
               <a:t>:</a:t>
             </a:r>
-            <a:endParaRPr lang="en-US" sz="1900" dirty="0" smtClean="0"/>
           </a:p>
           <a:p>
             <a:pPr lvl="1"/>
@@ -7977,15 +7968,7 @@
           <a:p>
             <a:r>
               <a:rPr lang="en-US" sz="1200" dirty="0" smtClean="0"/>
-              <a:t>All the calls </a:t>
-            </a:r>
-            <a:r>
-              <a:rPr lang="en-US" sz="1200" dirty="0" smtClean="0"/>
-              <a:t>shown behave as if they </a:t>
-            </a:r>
-            <a:r>
-              <a:rPr lang="en-US" sz="1200" dirty="0" smtClean="0"/>
-              <a:t>are RPC, i.e. request/response remote procedure calls.</a:t>
+              <a:t>All the calls shown behave as if they are RPC, i.e. request/response remote procedure calls.</a:t>
             </a:r>
           </a:p>
           <a:p>
@@ -8040,12 +8023,326 @@
           <a:p>
             <a:r>
               <a:rPr lang="en-US" sz="1050" dirty="0" smtClean="0"/>
-              <a:t>Dapr Sidecar interactions and Dapr iFX details are omitted.  Please see Dapr Docs for that.</a:t>
+              <a:t>Dapr Sidecar </a:t>
+            </a:r>
+            <a:r>
+              <a:rPr lang="en-US" sz="1050" dirty="0" smtClean="0"/>
+              <a:t>interaction &amp; </a:t>
+            </a:r>
+            <a:r>
+              <a:rPr lang="en-US" sz="1050" dirty="0" smtClean="0"/>
+              <a:t>Dapr </a:t>
+            </a:r>
+            <a:r>
+              <a:rPr lang="en-US" sz="1050" dirty="0" smtClean="0"/>
+              <a:t>infrastructure </a:t>
+            </a:r>
+            <a:r>
+              <a:rPr lang="en-US" sz="1050" dirty="0" smtClean="0"/>
+              <a:t>details are omitted.  Please see Dapr Docs for that.</a:t>
             </a:r>
             <a:endParaRPr lang="en-US" sz="1050" dirty="0"/>
           </a:p>
         </p:txBody>
       </p:sp>
+      <p:sp>
+        <p:nvSpPr>
+          <p:cNvPr id="42" name="Rectangle 41"/>
+          <p:cNvSpPr>
+            <a:spLocks noChangeArrowheads="1"/>
+          </p:cNvSpPr>
+          <p:nvPr/>
+        </p:nvSpPr>
+        <p:spPr bwMode="auto">
+          <a:xfrm>
+            <a:off x="2292664" y="3996898"/>
+            <a:ext cx="923925" cy="520700"/>
+          </a:xfrm>
+          <a:prstGeom prst="rect">
+            <a:avLst/>
+          </a:prstGeom>
+          <a:solidFill>
+            <a:srgbClr val="FF99FF"/>
+          </a:solidFill>
+          <a:ln w="9525">
+            <a:solidFill>
+              <a:schemeClr val="tx1"/>
+            </a:solidFill>
+            <a:miter lim="800000"/>
+            <a:headEnd/>
+            <a:tailEnd/>
+          </a:ln>
+        </p:spPr>
+        <p:txBody>
+          <a:bodyPr wrap="none" anchor="ctr"/>
+          <a:lstStyle>
+            <a:lvl1pPr eaLnBrk="0" hangingPunct="0">
+              <a:spcBef>
+                <a:spcPct val="20000"/>
+              </a:spcBef>
+              <a:buChar char="•"/>
+              <a:defRPr sz="3200">
+                <a:solidFill>
+                  <a:schemeClr val="tx1"/>
+                </a:solidFill>
+                <a:latin typeface="Times New Roman" pitchFamily="18" charset="0"/>
+              </a:defRPr>
+            </a:lvl1pPr>
+            <a:lvl2pPr marL="742950" indent="-285750" eaLnBrk="0" hangingPunct="0">
+              <a:spcBef>
+                <a:spcPct val="20000"/>
+              </a:spcBef>
+              <a:buChar char="–"/>
+              <a:defRPr sz="2800">
+                <a:solidFill>
+                  <a:schemeClr val="tx1"/>
+                </a:solidFill>
+                <a:latin typeface="Times New Roman" pitchFamily="18" charset="0"/>
+              </a:defRPr>
+            </a:lvl2pPr>
+            <a:lvl3pPr marL="1143000" indent="-228600" eaLnBrk="0" hangingPunct="0">
+              <a:spcBef>
+                <a:spcPct val="20000"/>
+              </a:spcBef>
+              <a:buChar char="•"/>
+              <a:defRPr sz="2400">
+                <a:solidFill>
+                  <a:schemeClr val="tx1"/>
+                </a:solidFill>
+                <a:latin typeface="Times New Roman" pitchFamily="18" charset="0"/>
+              </a:defRPr>
+            </a:lvl3pPr>
+            <a:lvl4pPr marL="1600200" indent="-228600" eaLnBrk="0" hangingPunct="0">
+              <a:spcBef>
+                <a:spcPct val="20000"/>
+              </a:spcBef>
+              <a:buChar char="–"/>
+              <a:defRPr sz="2000">
+                <a:solidFill>
+                  <a:schemeClr val="tx1"/>
+                </a:solidFill>
+                <a:latin typeface="Times New Roman" pitchFamily="18" charset="0"/>
+              </a:defRPr>
+            </a:lvl4pPr>
+            <a:lvl5pPr marL="2057400" indent="-228600" eaLnBrk="0" hangingPunct="0">
+              <a:spcBef>
+                <a:spcPct val="20000"/>
+              </a:spcBef>
+              <a:buChar char="»"/>
+              <a:defRPr sz="2000">
+                <a:solidFill>
+                  <a:schemeClr val="tx1"/>
+                </a:solidFill>
+                <a:latin typeface="Times New Roman" pitchFamily="18" charset="0"/>
+              </a:defRPr>
+            </a:lvl5pPr>
+            <a:lvl6pPr marL="2514600" indent="-228600" eaLnBrk="0" fontAlgn="base" hangingPunct="0">
+              <a:spcBef>
+                <a:spcPct val="20000"/>
+              </a:spcBef>
+              <a:spcAft>
+                <a:spcPct val="0"/>
+              </a:spcAft>
+              <a:buChar char="»"/>
+              <a:defRPr sz="2000">
+                <a:solidFill>
+                  <a:schemeClr val="tx1"/>
+                </a:solidFill>
+                <a:latin typeface="Times New Roman" pitchFamily="18" charset="0"/>
+              </a:defRPr>
+            </a:lvl6pPr>
+            <a:lvl7pPr marL="2971800" indent="-228600" eaLnBrk="0" fontAlgn="base" hangingPunct="0">
+              <a:spcBef>
+                <a:spcPct val="20000"/>
+              </a:spcBef>
+              <a:spcAft>
+                <a:spcPct val="0"/>
+              </a:spcAft>
+              <a:buChar char="»"/>
+              <a:defRPr sz="2000">
+                <a:solidFill>
+                  <a:schemeClr val="tx1"/>
+                </a:solidFill>
+                <a:latin typeface="Times New Roman" pitchFamily="18" charset="0"/>
+              </a:defRPr>
+            </a:lvl7pPr>
+            <a:lvl8pPr marL="3429000" indent="-228600" eaLnBrk="0" fontAlgn="base" hangingPunct="0">
+              <a:spcBef>
+                <a:spcPct val="20000"/>
+              </a:spcBef>
+              <a:spcAft>
+                <a:spcPct val="0"/>
+              </a:spcAft>
+              <a:buChar char="»"/>
+              <a:defRPr sz="2000">
+                <a:solidFill>
+                  <a:schemeClr val="tx1"/>
+                </a:solidFill>
+                <a:latin typeface="Times New Roman" pitchFamily="18" charset="0"/>
+              </a:defRPr>
+            </a:lvl8pPr>
+            <a:lvl9pPr marL="3886200" indent="-228600" eaLnBrk="0" fontAlgn="base" hangingPunct="0">
+              <a:spcBef>
+                <a:spcPct val="20000"/>
+              </a:spcBef>
+              <a:spcAft>
+                <a:spcPct val="0"/>
+              </a:spcAft>
+              <a:buChar char="»"/>
+              <a:defRPr sz="2000">
+                <a:solidFill>
+                  <a:schemeClr val="tx1"/>
+                </a:solidFill>
+                <a:latin typeface="Times New Roman" pitchFamily="18" charset="0"/>
+              </a:defRPr>
+            </a:lvl9pPr>
+          </a:lstStyle>
+          <a:p>
+            <a:pPr algn="ctr" eaLnBrk="1" hangingPunct="1">
+              <a:spcBef>
+                <a:spcPct val="0"/>
+              </a:spcBef>
+              <a:buFontTx/>
+              <a:buNone/>
+            </a:pPr>
+            <a:r>
+              <a:rPr lang="en-US" altLang="en-US" sz="1200" dirty="0" smtClean="0">
+                <a:latin typeface="Calibri" pitchFamily="34" charset="0"/>
+                <a:cs typeface="Calibri" pitchFamily="34" charset="0"/>
+              </a:rPr>
+              <a:t>Dapr </a:t>
+            </a:r>
+            <a:r>
+              <a:rPr lang="en-US" altLang="en-US" sz="1200" b="1" dirty="0" err="1" smtClean="0">
+                <a:latin typeface="Calibri" pitchFamily="34" charset="0"/>
+                <a:cs typeface="Calibri" pitchFamily="34" charset="0"/>
+              </a:rPr>
+              <a:t>mDNS</a:t>
+            </a:r>
+            <a:r>
+              <a:rPr lang="en-US" altLang="en-US" sz="1200" dirty="0" smtClean="0">
+                <a:latin typeface="Calibri" pitchFamily="34" charset="0"/>
+                <a:cs typeface="Calibri" pitchFamily="34" charset="0"/>
+              </a:rPr>
+              <a:t> </a:t>
+            </a:r>
+          </a:p>
+          <a:p>
+            <a:pPr algn="ctr" eaLnBrk="1" hangingPunct="1">
+              <a:spcBef>
+                <a:spcPct val="0"/>
+              </a:spcBef>
+              <a:buFontTx/>
+              <a:buNone/>
+            </a:pPr>
+            <a:r>
+              <a:rPr lang="en-US" altLang="en-US" sz="1200" dirty="0" smtClean="0">
+                <a:latin typeface="Calibri" pitchFamily="34" charset="0"/>
+                <a:cs typeface="Calibri" pitchFamily="34" charset="0"/>
+              </a:rPr>
+              <a:t>for Service</a:t>
+            </a:r>
+          </a:p>
+          <a:p>
+            <a:pPr algn="ctr" eaLnBrk="1" hangingPunct="1">
+              <a:spcBef>
+                <a:spcPct val="0"/>
+              </a:spcBef>
+              <a:buFontTx/>
+              <a:buNone/>
+            </a:pPr>
+            <a:r>
+              <a:rPr lang="en-US" altLang="en-US" sz="1200" dirty="0" smtClean="0">
+                <a:latin typeface="Calibri" pitchFamily="34" charset="0"/>
+                <a:cs typeface="Calibri" pitchFamily="34" charset="0"/>
+              </a:rPr>
+              <a:t>Discovery</a:t>
+            </a:r>
+            <a:endParaRPr lang="en-US" altLang="en-US" sz="1200" dirty="0">
+              <a:latin typeface="Calibri" pitchFamily="34" charset="0"/>
+              <a:cs typeface="Calibri" pitchFamily="34" charset="0"/>
+            </a:endParaRPr>
+          </a:p>
+        </p:txBody>
+      </p:sp>
+      <p:cxnSp>
+        <p:nvCxnSpPr>
+          <p:cNvPr id="46" name="Straight Arrow Connector 45"/>
+          <p:cNvCxnSpPr>
+            <a:stCxn id="13" idx="2"/>
+            <a:endCxn id="42" idx="3"/>
+          </p:cNvCxnSpPr>
+          <p:nvPr/>
+        </p:nvCxnSpPr>
+        <p:spPr>
+          <a:xfrm flipH="1">
+            <a:off x="3216589" y="3721100"/>
+            <a:ext cx="753426" cy="536148"/>
+          </a:xfrm>
+          <a:prstGeom prst="straightConnector1">
+            <a:avLst/>
+          </a:prstGeom>
+          <a:ln w="19050">
+            <a:solidFill>
+              <a:schemeClr val="tx1"/>
+            </a:solidFill>
+            <a:tailEnd type="arrow"/>
+          </a:ln>
+        </p:spPr>
+        <p:style>
+          <a:lnRef idx="1">
+            <a:schemeClr val="accent1"/>
+          </a:lnRef>
+          <a:fillRef idx="0">
+            <a:schemeClr val="accent1"/>
+          </a:fillRef>
+          <a:effectRef idx="0">
+            <a:schemeClr val="accent1"/>
+          </a:effectRef>
+          <a:fontRef idx="minor">
+            <a:schemeClr val="tx1"/>
+          </a:fontRef>
+        </p:style>
+      </p:cxnSp>
+      <p:cxnSp>
+        <p:nvCxnSpPr>
+          <p:cNvPr id="48" name="Straight Arrow Connector 47"/>
+          <p:cNvCxnSpPr>
+            <a:stCxn id="11" idx="0"/>
+            <a:endCxn id="42" idx="3"/>
+          </p:cNvCxnSpPr>
+          <p:nvPr/>
+        </p:nvCxnSpPr>
+        <p:spPr>
+          <a:xfrm flipH="1" flipV="1">
+            <a:off x="3216589" y="4257248"/>
+            <a:ext cx="753425" cy="443022"/>
+          </a:xfrm>
+          <a:prstGeom prst="straightConnector1">
+            <a:avLst/>
+          </a:prstGeom>
+          <a:ln w="19050">
+            <a:solidFill>
+              <a:schemeClr val="tx1"/>
+            </a:solidFill>
+            <a:tailEnd type="arrow"/>
+          </a:ln>
+        </p:spPr>
+        <p:style>
+          <a:lnRef idx="1">
+            <a:schemeClr val="accent1"/>
+          </a:lnRef>
+          <a:fillRef idx="0">
+            <a:schemeClr val="accent1"/>
+          </a:fillRef>
+          <a:effectRef idx="0">
+            <a:schemeClr val="accent1"/>
+          </a:effectRef>
+          <a:fontRef idx="minor">
+            <a:schemeClr val="tx1"/>
+          </a:fontRef>
+        </p:style>
+      </p:cxnSp>
     </p:spTree>
     <p:extLst>
       <p:ext uri="{BB962C8B-B14F-4D97-AF65-F5344CB8AC3E}">
@@ -8093,15 +8390,7 @@
           <a:p>
             <a:r>
               <a:rPr lang="en-US" dirty="0" smtClean="0"/>
-              <a:t>Links to </a:t>
-            </a:r>
-            <a:r>
-              <a:rPr lang="en-US" dirty="0" smtClean="0"/>
-              <a:t>Relevant Dapr </a:t>
-            </a:r>
-            <a:r>
-              <a:rPr lang="en-US" dirty="0" smtClean="0"/>
-              <a:t>Docs</a:t>
+              <a:t>Links to Relevant Dapr Docs</a:t>
             </a:r>
             <a:endParaRPr lang="en-US" dirty="0"/>
           </a:p>
@@ -8207,11 +8496,7 @@
           <a:p>
             <a:r>
               <a:rPr lang="en-US" sz="1800" dirty="0" smtClean="0"/>
-              <a:t>Dapr Concepts Overview:  Contains diagrams of the details of how Dapr sidecars communicate with each other, plus the other parts of the Dapr Infrastructure.  </a:t>
-            </a:r>
-            <a:r>
-              <a:rPr lang="en-US" sz="1800" dirty="0" smtClean="0"/>
-              <a:t>This is a </a:t>
+              <a:t>Dapr Concepts Overview:  Contains diagrams of the details of how Dapr sidecars communicate with each other, plus the other parts of the Dapr Infrastructure.  This is a </a:t>
             </a:r>
             <a:r>
               <a:rPr lang="en-US" sz="1800" u="sng" dirty="0" smtClean="0"/>

</xml_diff>

<commit_message>
Fixed typos.  Deleted the 2 last slides that were experimenta.
</commit_message>
<xml_diff>
--- a/dapr-proxy-service-invocation/Using the Dapr Proxy for Service Invocation.pptx
+++ b/dapr-proxy-service-invocation/Using the Dapr Proxy for Service Invocation.pptx
@@ -11,8 +11,6 @@
     <p:sldId id="275" r:id="rId5"/>
     <p:sldId id="273" r:id="rId6"/>
     <p:sldId id="277" r:id="rId7"/>
-    <p:sldId id="271" r:id="rId8"/>
-    <p:sldId id="276" r:id="rId9"/>
   </p:sldIdLst>
   <p:sldSz cx="9144000" cy="6858000" type="screen4x3"/>
   <p:notesSz cx="7010400" cy="9296400"/>
@@ -122,8 +120,6 @@
             <p14:sldId id="275"/>
             <p14:sldId id="273"/>
             <p14:sldId id="277"/>
-            <p14:sldId id="271"/>
-            <p14:sldId id="276"/>
           </p14:sldIdLst>
         </p14:section>
       </p14:sectionLst>
@@ -326,7 +322,7 @@
           <a:p>
             <a:fld id="{CFC37855-D03C-49F4-B68F-729DF42794A3}" type="datetimeFigureOut">
               <a:rPr lang="en-US" smtClean="0"/>
-              <a:t>12/31/2022</a:t>
+              <a:t>1/3/2023</a:t>
             </a:fld>
             <a:endParaRPr lang="en-US"/>
           </a:p>
@@ -679,7 +675,7 @@
           <a:p>
             <a:fld id="{CFC37855-D03C-49F4-B68F-729DF42794A3}" type="datetimeFigureOut">
               <a:rPr lang="en-US" smtClean="0"/>
-              <a:t>12/31/2022</a:t>
+              <a:t>1/3/2023</a:t>
             </a:fld>
             <a:endParaRPr lang="en-US"/>
           </a:p>
@@ -854,7 +850,7 @@
           <a:p>
             <a:fld id="{CFC37855-D03C-49F4-B68F-729DF42794A3}" type="datetimeFigureOut">
               <a:rPr lang="en-US" smtClean="0"/>
-              <a:t>12/31/2022</a:t>
+              <a:t>1/3/2023</a:t>
             </a:fld>
             <a:endParaRPr lang="en-US"/>
           </a:p>
@@ -967,7 +963,7 @@
           <a:p>
             <a:fld id="{CFC37855-D03C-49F4-B68F-729DF42794A3}" type="datetimeFigureOut">
               <a:rPr lang="en-US" smtClean="0"/>
-              <a:t>12/31/2022</a:t>
+              <a:t>1/3/2023</a:t>
             </a:fld>
             <a:endParaRPr lang="en-US"/>
           </a:p>
@@ -1325,7 +1321,7 @@
           <a:p>
             <a:fld id="{CFC37855-D03C-49F4-B68F-729DF42794A3}" type="datetimeFigureOut">
               <a:rPr lang="en-US" smtClean="0"/>
-              <a:t>12/31/2022</a:t>
+              <a:t>1/3/2023</a:t>
             </a:fld>
             <a:endParaRPr lang="en-US"/>
           </a:p>
@@ -1590,7 +1586,7 @@
           <a:p>
             <a:fld id="{CFC37855-D03C-49F4-B68F-729DF42794A3}" type="datetimeFigureOut">
               <a:rPr lang="en-US" smtClean="0"/>
-              <a:t>12/31/2022</a:t>
+              <a:t>1/3/2023</a:t>
             </a:fld>
             <a:endParaRPr lang="en-US"/>
           </a:p>
@@ -1952,7 +1948,7 @@
           <a:p>
             <a:fld id="{CFC37855-D03C-49F4-B68F-729DF42794A3}" type="datetimeFigureOut">
               <a:rPr lang="en-US" smtClean="0"/>
-              <a:t>12/31/2022</a:t>
+              <a:t>1/3/2023</a:t>
             </a:fld>
             <a:endParaRPr lang="en-US"/>
           </a:p>
@@ -2179,7 +2175,7 @@
           <a:p>
             <a:fld id="{CFC37855-D03C-49F4-B68F-729DF42794A3}" type="datetimeFigureOut">
               <a:rPr lang="en-US" smtClean="0"/>
-              <a:t>12/31/2022</a:t>
+              <a:t>1/3/2023</a:t>
             </a:fld>
             <a:endParaRPr lang="en-US"/>
           </a:p>
@@ -2269,7 +2265,7 @@
           <a:p>
             <a:fld id="{CFC37855-D03C-49F4-B68F-729DF42794A3}" type="datetimeFigureOut">
               <a:rPr lang="en-US" smtClean="0"/>
-              <a:t>12/31/2022</a:t>
+              <a:t>1/3/2023</a:t>
             </a:fld>
             <a:endParaRPr lang="en-US"/>
           </a:p>
@@ -2536,7 +2532,7 @@
           <a:p>
             <a:fld id="{CFC37855-D03C-49F4-B68F-729DF42794A3}" type="datetimeFigureOut">
               <a:rPr lang="en-US" smtClean="0"/>
-              <a:t>12/31/2022</a:t>
+              <a:t>1/3/2023</a:t>
             </a:fld>
             <a:endParaRPr lang="en-US"/>
           </a:p>
@@ -2764,7 +2760,7 @@
           <a:p>
             <a:fld id="{CFC37855-D03C-49F4-B68F-729DF42794A3}" type="datetimeFigureOut">
               <a:rPr lang="en-US" smtClean="0"/>
-              <a:t>12/31/2022</a:t>
+              <a:t>1/3/2023</a:t>
             </a:fld>
             <a:endParaRPr lang="en-US"/>
           </a:p>
@@ -3263,7 +3259,7 @@
           <a:p>
             <a:fld id="{CFC37855-D03C-49F4-B68F-729DF42794A3}" type="datetimeFigureOut">
               <a:rPr lang="en-US" smtClean="0"/>
-              <a:t>12/31/2022</a:t>
+              <a:t>1/3/2023</a:t>
             </a:fld>
             <a:endParaRPr lang="en-US"/>
           </a:p>
@@ -3697,8 +3693,8 @@
           </a:p>
           <a:p>
             <a:r>
-              <a:rPr lang="en-US" sz="1800" dirty="0" smtClean="0"/>
-              <a:t>12/31/22</a:t>
+              <a:rPr lang="en-US" sz="1800" smtClean="0"/>
+              <a:t>1/3/23</a:t>
             </a:r>
             <a:endParaRPr lang="en-US" sz="1800" dirty="0" smtClean="0"/>
           </a:p>
@@ -5656,18 +5652,22 @@
             </a:r>
             <a:r>
               <a:rPr lang="en-US" sz="1400" dirty="0" err="1" smtClean="0"/>
-              <a:t>RunselfHosted</a:t>
+              <a:t>RunSelfHosted</a:t>
             </a:r>
             <a:r>
               <a:rPr lang="en-US" sz="1400" dirty="0" smtClean="0"/>
-              <a:t> folder to see how to use the below </a:t>
+              <a:t> </a:t>
+            </a:r>
+            <a:r>
+              <a:rPr lang="en-US" sz="1400" dirty="0" smtClean="0"/>
+              <a:t>folder to see how to use the below </a:t>
             </a:r>
             <a:r>
               <a:rPr lang="en-US" sz="1400" dirty="0" err="1" smtClean="0"/>
               <a:t>dapr</a:t>
             </a:r>
             <a:r>
-              <a:rPr lang="en-US" sz="1400" smtClean="0"/>
+              <a:rPr lang="en-US" sz="1400" dirty="0" smtClean="0"/>
               <a:t> run commands</a:t>
             </a:r>
             <a:r>
@@ -8023,23 +8023,7 @@
           <a:p>
             <a:r>
               <a:rPr lang="en-US" sz="1050" dirty="0" smtClean="0"/>
-              <a:t>Dapr Sidecar </a:t>
-            </a:r>
-            <a:r>
-              <a:rPr lang="en-US" sz="1050" dirty="0" smtClean="0"/>
-              <a:t>interaction &amp; </a:t>
-            </a:r>
-            <a:r>
-              <a:rPr lang="en-US" sz="1050" dirty="0" smtClean="0"/>
-              <a:t>Dapr </a:t>
-            </a:r>
-            <a:r>
-              <a:rPr lang="en-US" sz="1050" dirty="0" smtClean="0"/>
-              <a:t>infrastructure </a:t>
-            </a:r>
-            <a:r>
-              <a:rPr lang="en-US" sz="1050" dirty="0" smtClean="0"/>
-              <a:t>details are omitted.  Please see Dapr Docs for that.</a:t>
+              <a:t>Dapr Sidecar interaction &amp; Dapr infrastructure details are omitted.  Please see Dapr Docs for that.</a:t>
             </a:r>
             <a:endParaRPr lang="en-US" sz="1050" dirty="0"/>
           </a:p>
@@ -8523,1029 +8507,6 @@
     <p:extLst>
       <p:ext uri="{BB962C8B-B14F-4D97-AF65-F5344CB8AC3E}">
         <p14:creationId xmlns:p14="http://schemas.microsoft.com/office/powerpoint/2010/main" val="1764760846"/>
-      </p:ext>
-    </p:extLst>
-  </p:cSld>
-  <p:clrMapOvr>
-    <a:masterClrMapping/>
-  </p:clrMapOvr>
-</p:sld>
-</file>
-
-<file path=ppt/slides/slide7.xml><?xml version="1.0" encoding="utf-8"?>
-<p:sld xmlns:a="http://schemas.openxmlformats.org/drawingml/2006/main" xmlns:r="http://schemas.openxmlformats.org/officeDocument/2006/relationships" xmlns:p="http://schemas.openxmlformats.org/presentationml/2006/main">
-  <p:cSld>
-    <p:spTree>
-      <p:nvGrpSpPr>
-        <p:cNvPr id="1" name=""/>
-        <p:cNvGrpSpPr/>
-        <p:nvPr/>
-      </p:nvGrpSpPr>
-      <p:grpSpPr>
-        <a:xfrm>
-          <a:off x="0" y="0"/>
-          <a:ext cx="0" cy="0"/>
-          <a:chOff x="0" y="0"/>
-          <a:chExt cx="0" cy="0"/>
-        </a:xfrm>
-      </p:grpSpPr>
-      <p:sp>
-        <p:nvSpPr>
-          <p:cNvPr id="2" name="Title 1"/>
-          <p:cNvSpPr>
-            <a:spLocks noGrp="1"/>
-          </p:cNvSpPr>
-          <p:nvPr>
-            <p:ph type="title"/>
-          </p:nvPr>
-        </p:nvSpPr>
-        <p:spPr/>
-        <p:txBody>
-          <a:bodyPr/>
-          <a:lstStyle/>
-          <a:p>
-            <a:r>
-              <a:rPr lang="en-US" dirty="0" smtClean="0"/>
-              <a:t>Warning – Construction Zone</a:t>
-            </a:r>
-            <a:endParaRPr lang="en-US" dirty="0"/>
-          </a:p>
-        </p:txBody>
-      </p:sp>
-      <p:sp>
-        <p:nvSpPr>
-          <p:cNvPr id="3" name="Content Placeholder 2"/>
-          <p:cNvSpPr>
-            <a:spLocks noGrp="1"/>
-          </p:cNvSpPr>
-          <p:nvPr>
-            <p:ph sz="quarter" idx="1"/>
-          </p:nvPr>
-        </p:nvSpPr>
-        <p:spPr/>
-        <p:txBody>
-          <a:bodyPr/>
-          <a:lstStyle/>
-          <a:p>
-            <a:r>
-              <a:rPr lang="en-US" dirty="0" smtClean="0"/>
-              <a:t>The slides for this project are currently being made and/or revised.</a:t>
-            </a:r>
-          </a:p>
-        </p:txBody>
-      </p:sp>
-    </p:spTree>
-    <p:extLst>
-      <p:ext uri="{BB962C8B-B14F-4D97-AF65-F5344CB8AC3E}">
-        <p14:creationId xmlns:p14="http://schemas.microsoft.com/office/powerpoint/2010/main" val="2299054217"/>
-      </p:ext>
-    </p:extLst>
-  </p:cSld>
-  <p:clrMapOvr>
-    <a:masterClrMapping/>
-  </p:clrMapOvr>
-</p:sld>
-</file>
-
-<file path=ppt/slides/slide8.xml><?xml version="1.0" encoding="utf-8"?>
-<p:sld xmlns:a="http://schemas.openxmlformats.org/drawingml/2006/main" xmlns:r="http://schemas.openxmlformats.org/officeDocument/2006/relationships" xmlns:p="http://schemas.openxmlformats.org/presentationml/2006/main">
-  <p:cSld>
-    <p:spTree>
-      <p:nvGrpSpPr>
-        <p:cNvPr id="1" name=""/>
-        <p:cNvGrpSpPr/>
-        <p:nvPr/>
-      </p:nvGrpSpPr>
-      <p:grpSpPr>
-        <a:xfrm>
-          <a:off x="0" y="0"/>
-          <a:ext cx="0" cy="0"/>
-          <a:chOff x="0" y="0"/>
-          <a:chExt cx="0" cy="0"/>
-        </a:xfrm>
-      </p:grpSpPr>
-      <p:sp>
-        <p:nvSpPr>
-          <p:cNvPr id="2" name="Title 1"/>
-          <p:cNvSpPr>
-            <a:spLocks noGrp="1"/>
-          </p:cNvSpPr>
-          <p:nvPr>
-            <p:ph type="title"/>
-          </p:nvPr>
-        </p:nvSpPr>
-        <p:spPr>
-          <a:xfrm>
-            <a:off x="685800" y="152400"/>
-            <a:ext cx="7772400" cy="792162"/>
-          </a:xfrm>
-        </p:spPr>
-        <p:txBody>
-          <a:bodyPr>
-            <a:normAutofit fontScale="90000"/>
-          </a:bodyPr>
-          <a:lstStyle/>
-          <a:p>
-            <a:r>
-              <a:rPr lang="en-US" dirty="0" smtClean="0"/>
-              <a:t>Extra Detailed View of Dapr Interactions</a:t>
-            </a:r>
-            <a:endParaRPr lang="en-US" dirty="0"/>
-          </a:p>
-        </p:txBody>
-      </p:sp>
-      <p:sp>
-        <p:nvSpPr>
-          <p:cNvPr id="3" name="Content Placeholder 2"/>
-          <p:cNvSpPr>
-            <a:spLocks noGrp="1"/>
-          </p:cNvSpPr>
-          <p:nvPr>
-            <p:ph sz="quarter" idx="1"/>
-          </p:nvPr>
-        </p:nvSpPr>
-        <p:spPr>
-          <a:xfrm>
-            <a:off x="685800" y="838200"/>
-            <a:ext cx="7772400" cy="5334000"/>
-          </a:xfrm>
-        </p:spPr>
-        <p:txBody>
-          <a:bodyPr/>
-          <a:lstStyle/>
-          <a:p>
-            <a:r>
-              <a:rPr lang="en-US" sz="2400" dirty="0" smtClean="0"/>
-              <a:t>Here</a:t>
-            </a:r>
-            <a:r>
-              <a:rPr lang="en-US" dirty="0" smtClean="0"/>
-              <a:t> are the interactions between the Dapr Sidecars </a:t>
-            </a:r>
-            <a:r>
-              <a:rPr lang="en-US" smtClean="0"/>
-              <a:t>and WebAPI1 </a:t>
-            </a:r>
-            <a:r>
-              <a:rPr lang="en-US" dirty="0" smtClean="0"/>
-              <a:t>and ServiceA.</a:t>
-            </a:r>
-          </a:p>
-          <a:p>
-            <a:r>
-              <a:rPr lang="en-US" sz="1800" dirty="0" smtClean="0"/>
-              <a:t>The interaction between the Quick Test Client and WebAPI1 is omitted.</a:t>
-            </a:r>
-            <a:endParaRPr lang="en-US" sz="1800" dirty="0"/>
-          </a:p>
-        </p:txBody>
-      </p:sp>
-      <p:sp>
-        <p:nvSpPr>
-          <p:cNvPr id="12" name="Rectangle 19"/>
-          <p:cNvSpPr>
-            <a:spLocks noChangeArrowheads="1"/>
-          </p:cNvSpPr>
-          <p:nvPr/>
-        </p:nvSpPr>
-        <p:spPr bwMode="auto">
-          <a:xfrm>
-            <a:off x="3508054" y="2286000"/>
-            <a:ext cx="923925" cy="520700"/>
-          </a:xfrm>
-          <a:prstGeom prst="rect">
-            <a:avLst/>
-          </a:prstGeom>
-          <a:solidFill>
-            <a:srgbClr val="FFFF00"/>
-          </a:solidFill>
-          <a:ln w="9525">
-            <a:solidFill>
-              <a:schemeClr val="tx1"/>
-            </a:solidFill>
-            <a:miter lim="800000"/>
-            <a:headEnd/>
-            <a:tailEnd/>
-          </a:ln>
-        </p:spPr>
-        <p:txBody>
-          <a:bodyPr wrap="none" anchor="ctr"/>
-          <a:lstStyle>
-            <a:lvl1pPr eaLnBrk="0" hangingPunct="0">
-              <a:spcBef>
-                <a:spcPct val="20000"/>
-              </a:spcBef>
-              <a:buChar char="•"/>
-              <a:defRPr sz="3200">
-                <a:solidFill>
-                  <a:schemeClr val="tx1"/>
-                </a:solidFill>
-                <a:latin typeface="Times New Roman" pitchFamily="18" charset="0"/>
-              </a:defRPr>
-            </a:lvl1pPr>
-            <a:lvl2pPr marL="742950" indent="-285750" eaLnBrk="0" hangingPunct="0">
-              <a:spcBef>
-                <a:spcPct val="20000"/>
-              </a:spcBef>
-              <a:buChar char="–"/>
-              <a:defRPr sz="2800">
-                <a:solidFill>
-                  <a:schemeClr val="tx1"/>
-                </a:solidFill>
-                <a:latin typeface="Times New Roman" pitchFamily="18" charset="0"/>
-              </a:defRPr>
-            </a:lvl2pPr>
-            <a:lvl3pPr marL="1143000" indent="-228600" eaLnBrk="0" hangingPunct="0">
-              <a:spcBef>
-                <a:spcPct val="20000"/>
-              </a:spcBef>
-              <a:buChar char="•"/>
-              <a:defRPr sz="2400">
-                <a:solidFill>
-                  <a:schemeClr val="tx1"/>
-                </a:solidFill>
-                <a:latin typeface="Times New Roman" pitchFamily="18" charset="0"/>
-              </a:defRPr>
-            </a:lvl3pPr>
-            <a:lvl4pPr marL="1600200" indent="-228600" eaLnBrk="0" hangingPunct="0">
-              <a:spcBef>
-                <a:spcPct val="20000"/>
-              </a:spcBef>
-              <a:buChar char="–"/>
-              <a:defRPr sz="2000">
-                <a:solidFill>
-                  <a:schemeClr val="tx1"/>
-                </a:solidFill>
-                <a:latin typeface="Times New Roman" pitchFamily="18" charset="0"/>
-              </a:defRPr>
-            </a:lvl4pPr>
-            <a:lvl5pPr marL="2057400" indent="-228600" eaLnBrk="0" hangingPunct="0">
-              <a:spcBef>
-                <a:spcPct val="20000"/>
-              </a:spcBef>
-              <a:buChar char="»"/>
-              <a:defRPr sz="2000">
-                <a:solidFill>
-                  <a:schemeClr val="tx1"/>
-                </a:solidFill>
-                <a:latin typeface="Times New Roman" pitchFamily="18" charset="0"/>
-              </a:defRPr>
-            </a:lvl5pPr>
-            <a:lvl6pPr marL="2514600" indent="-228600" eaLnBrk="0" fontAlgn="base" hangingPunct="0">
-              <a:spcBef>
-                <a:spcPct val="20000"/>
-              </a:spcBef>
-              <a:spcAft>
-                <a:spcPct val="0"/>
-              </a:spcAft>
-              <a:buChar char="»"/>
-              <a:defRPr sz="2000">
-                <a:solidFill>
-                  <a:schemeClr val="tx1"/>
-                </a:solidFill>
-                <a:latin typeface="Times New Roman" pitchFamily="18" charset="0"/>
-              </a:defRPr>
-            </a:lvl6pPr>
-            <a:lvl7pPr marL="2971800" indent="-228600" eaLnBrk="0" fontAlgn="base" hangingPunct="0">
-              <a:spcBef>
-                <a:spcPct val="20000"/>
-              </a:spcBef>
-              <a:spcAft>
-                <a:spcPct val="0"/>
-              </a:spcAft>
-              <a:buChar char="»"/>
-              <a:defRPr sz="2000">
-                <a:solidFill>
-                  <a:schemeClr val="tx1"/>
-                </a:solidFill>
-                <a:latin typeface="Times New Roman" pitchFamily="18" charset="0"/>
-              </a:defRPr>
-            </a:lvl7pPr>
-            <a:lvl8pPr marL="3429000" indent="-228600" eaLnBrk="0" fontAlgn="base" hangingPunct="0">
-              <a:spcBef>
-                <a:spcPct val="20000"/>
-              </a:spcBef>
-              <a:spcAft>
-                <a:spcPct val="0"/>
-              </a:spcAft>
-              <a:buChar char="»"/>
-              <a:defRPr sz="2000">
-                <a:solidFill>
-                  <a:schemeClr val="tx1"/>
-                </a:solidFill>
-                <a:latin typeface="Times New Roman" pitchFamily="18" charset="0"/>
-              </a:defRPr>
-            </a:lvl8pPr>
-            <a:lvl9pPr marL="3886200" indent="-228600" eaLnBrk="0" fontAlgn="base" hangingPunct="0">
-              <a:spcBef>
-                <a:spcPct val="20000"/>
-              </a:spcBef>
-              <a:spcAft>
-                <a:spcPct val="0"/>
-              </a:spcAft>
-              <a:buChar char="»"/>
-              <a:defRPr sz="2000">
-                <a:solidFill>
-                  <a:schemeClr val="tx1"/>
-                </a:solidFill>
-                <a:latin typeface="Times New Roman" pitchFamily="18" charset="0"/>
-              </a:defRPr>
-            </a:lvl9pPr>
-          </a:lstStyle>
-          <a:p>
-            <a:pPr algn="ctr" eaLnBrk="1" hangingPunct="1">
-              <a:spcBef>
-                <a:spcPct val="0"/>
-              </a:spcBef>
-              <a:buFontTx/>
-              <a:buNone/>
-            </a:pPr>
-            <a:r>
-              <a:rPr lang="en-US" altLang="en-US" sz="1200" dirty="0" smtClean="0">
-                <a:solidFill>
-                  <a:prstClr val="black"/>
-                </a:solidFill>
-                <a:latin typeface="Calibri" pitchFamily="34" charset="0"/>
-                <a:cs typeface="Calibri" pitchFamily="34" charset="0"/>
-              </a:rPr>
-              <a:t>WebAPI1</a:t>
-            </a:r>
-            <a:endParaRPr lang="en-US" altLang="en-US" sz="1200" dirty="0">
-              <a:solidFill>
-                <a:prstClr val="black"/>
-              </a:solidFill>
-              <a:latin typeface="Calibri" pitchFamily="34" charset="0"/>
-              <a:cs typeface="Calibri" pitchFamily="34" charset="0"/>
-            </a:endParaRPr>
-          </a:p>
-        </p:txBody>
-      </p:sp>
-      <p:sp>
-        <p:nvSpPr>
-          <p:cNvPr id="13" name="Rectangle 12"/>
-          <p:cNvSpPr>
-            <a:spLocks noChangeArrowheads="1"/>
-          </p:cNvSpPr>
-          <p:nvPr/>
-        </p:nvSpPr>
-        <p:spPr bwMode="auto">
-          <a:xfrm>
-            <a:off x="3508052" y="3406140"/>
-            <a:ext cx="923925" cy="520700"/>
-          </a:xfrm>
-          <a:prstGeom prst="rect">
-            <a:avLst/>
-          </a:prstGeom>
-          <a:solidFill>
-            <a:srgbClr val="FF99FF"/>
-          </a:solidFill>
-          <a:ln w="9525">
-            <a:solidFill>
-              <a:schemeClr val="tx1"/>
-            </a:solidFill>
-            <a:miter lim="800000"/>
-            <a:headEnd/>
-            <a:tailEnd/>
-          </a:ln>
-        </p:spPr>
-        <p:txBody>
-          <a:bodyPr wrap="none" anchor="ctr"/>
-          <a:lstStyle>
-            <a:lvl1pPr eaLnBrk="0" hangingPunct="0">
-              <a:spcBef>
-                <a:spcPct val="20000"/>
-              </a:spcBef>
-              <a:buChar char="•"/>
-              <a:defRPr sz="3200">
-                <a:solidFill>
-                  <a:schemeClr val="tx1"/>
-                </a:solidFill>
-                <a:latin typeface="Times New Roman" pitchFamily="18" charset="0"/>
-              </a:defRPr>
-            </a:lvl1pPr>
-            <a:lvl2pPr marL="742950" indent="-285750" eaLnBrk="0" hangingPunct="0">
-              <a:spcBef>
-                <a:spcPct val="20000"/>
-              </a:spcBef>
-              <a:buChar char="–"/>
-              <a:defRPr sz="2800">
-                <a:solidFill>
-                  <a:schemeClr val="tx1"/>
-                </a:solidFill>
-                <a:latin typeface="Times New Roman" pitchFamily="18" charset="0"/>
-              </a:defRPr>
-            </a:lvl2pPr>
-            <a:lvl3pPr marL="1143000" indent="-228600" eaLnBrk="0" hangingPunct="0">
-              <a:spcBef>
-                <a:spcPct val="20000"/>
-              </a:spcBef>
-              <a:buChar char="•"/>
-              <a:defRPr sz="2400">
-                <a:solidFill>
-                  <a:schemeClr val="tx1"/>
-                </a:solidFill>
-                <a:latin typeface="Times New Roman" pitchFamily="18" charset="0"/>
-              </a:defRPr>
-            </a:lvl3pPr>
-            <a:lvl4pPr marL="1600200" indent="-228600" eaLnBrk="0" hangingPunct="0">
-              <a:spcBef>
-                <a:spcPct val="20000"/>
-              </a:spcBef>
-              <a:buChar char="–"/>
-              <a:defRPr sz="2000">
-                <a:solidFill>
-                  <a:schemeClr val="tx1"/>
-                </a:solidFill>
-                <a:latin typeface="Times New Roman" pitchFamily="18" charset="0"/>
-              </a:defRPr>
-            </a:lvl4pPr>
-            <a:lvl5pPr marL="2057400" indent="-228600" eaLnBrk="0" hangingPunct="0">
-              <a:spcBef>
-                <a:spcPct val="20000"/>
-              </a:spcBef>
-              <a:buChar char="»"/>
-              <a:defRPr sz="2000">
-                <a:solidFill>
-                  <a:schemeClr val="tx1"/>
-                </a:solidFill>
-                <a:latin typeface="Times New Roman" pitchFamily="18" charset="0"/>
-              </a:defRPr>
-            </a:lvl5pPr>
-            <a:lvl6pPr marL="2514600" indent="-228600" eaLnBrk="0" fontAlgn="base" hangingPunct="0">
-              <a:spcBef>
-                <a:spcPct val="20000"/>
-              </a:spcBef>
-              <a:spcAft>
-                <a:spcPct val="0"/>
-              </a:spcAft>
-              <a:buChar char="»"/>
-              <a:defRPr sz="2000">
-                <a:solidFill>
-                  <a:schemeClr val="tx1"/>
-                </a:solidFill>
-                <a:latin typeface="Times New Roman" pitchFamily="18" charset="0"/>
-              </a:defRPr>
-            </a:lvl6pPr>
-            <a:lvl7pPr marL="2971800" indent="-228600" eaLnBrk="0" fontAlgn="base" hangingPunct="0">
-              <a:spcBef>
-                <a:spcPct val="20000"/>
-              </a:spcBef>
-              <a:spcAft>
-                <a:spcPct val="0"/>
-              </a:spcAft>
-              <a:buChar char="»"/>
-              <a:defRPr sz="2000">
-                <a:solidFill>
-                  <a:schemeClr val="tx1"/>
-                </a:solidFill>
-                <a:latin typeface="Times New Roman" pitchFamily="18" charset="0"/>
-              </a:defRPr>
-            </a:lvl7pPr>
-            <a:lvl8pPr marL="3429000" indent="-228600" eaLnBrk="0" fontAlgn="base" hangingPunct="0">
-              <a:spcBef>
-                <a:spcPct val="20000"/>
-              </a:spcBef>
-              <a:spcAft>
-                <a:spcPct val="0"/>
-              </a:spcAft>
-              <a:buChar char="»"/>
-              <a:defRPr sz="2000">
-                <a:solidFill>
-                  <a:schemeClr val="tx1"/>
-                </a:solidFill>
-                <a:latin typeface="Times New Roman" pitchFamily="18" charset="0"/>
-              </a:defRPr>
-            </a:lvl8pPr>
-            <a:lvl9pPr marL="3886200" indent="-228600" eaLnBrk="0" fontAlgn="base" hangingPunct="0">
-              <a:spcBef>
-                <a:spcPct val="20000"/>
-              </a:spcBef>
-              <a:spcAft>
-                <a:spcPct val="0"/>
-              </a:spcAft>
-              <a:buChar char="»"/>
-              <a:defRPr sz="2000">
-                <a:solidFill>
-                  <a:schemeClr val="tx1"/>
-                </a:solidFill>
-                <a:latin typeface="Times New Roman" pitchFamily="18" charset="0"/>
-              </a:defRPr>
-            </a:lvl9pPr>
-          </a:lstStyle>
-          <a:p>
-            <a:pPr algn="ctr" eaLnBrk="1" hangingPunct="1">
-              <a:spcBef>
-                <a:spcPct val="0"/>
-              </a:spcBef>
-              <a:buFontTx/>
-              <a:buNone/>
-            </a:pPr>
-            <a:r>
-              <a:rPr lang="en-US" altLang="en-US" sz="1200" dirty="0" smtClean="0">
-                <a:solidFill>
-                  <a:prstClr val="black"/>
-                </a:solidFill>
-                <a:latin typeface="Calibri" pitchFamily="34" charset="0"/>
-                <a:cs typeface="Calibri" pitchFamily="34" charset="0"/>
-              </a:rPr>
-              <a:t>Dapr Sidecar </a:t>
-            </a:r>
-          </a:p>
-          <a:p>
-            <a:pPr algn="ctr" eaLnBrk="1" hangingPunct="1">
-              <a:spcBef>
-                <a:spcPct val="0"/>
-              </a:spcBef>
-              <a:buFontTx/>
-              <a:buNone/>
-            </a:pPr>
-            <a:r>
-              <a:rPr lang="en-US" altLang="en-US" sz="1200" dirty="0" smtClean="0">
-                <a:solidFill>
-                  <a:prstClr val="black"/>
-                </a:solidFill>
-                <a:latin typeface="Calibri" pitchFamily="34" charset="0"/>
-                <a:cs typeface="Calibri" pitchFamily="34" charset="0"/>
-              </a:rPr>
-              <a:t>for WebAPI1</a:t>
-            </a:r>
-            <a:endParaRPr lang="en-US" altLang="en-US" sz="1200" dirty="0">
-              <a:solidFill>
-                <a:prstClr val="black"/>
-              </a:solidFill>
-              <a:latin typeface="Calibri" pitchFamily="34" charset="0"/>
-              <a:cs typeface="Calibri" pitchFamily="34" charset="0"/>
-            </a:endParaRPr>
-          </a:p>
-        </p:txBody>
-      </p:sp>
-      <p:sp>
-        <p:nvSpPr>
-          <p:cNvPr id="10" name="Rectangle 19"/>
-          <p:cNvSpPr>
-            <a:spLocks noChangeArrowheads="1"/>
-          </p:cNvSpPr>
-          <p:nvPr/>
-        </p:nvSpPr>
-        <p:spPr bwMode="auto">
-          <a:xfrm>
-            <a:off x="3523296" y="5615940"/>
-            <a:ext cx="923925" cy="520700"/>
-          </a:xfrm>
-          <a:prstGeom prst="rect">
-            <a:avLst/>
-          </a:prstGeom>
-          <a:solidFill>
-            <a:srgbClr val="FFFF00"/>
-          </a:solidFill>
-          <a:ln w="9525">
-            <a:solidFill>
-              <a:schemeClr val="tx1"/>
-            </a:solidFill>
-            <a:miter lim="800000"/>
-            <a:headEnd/>
-            <a:tailEnd/>
-          </a:ln>
-        </p:spPr>
-        <p:txBody>
-          <a:bodyPr wrap="none" anchor="ctr"/>
-          <a:lstStyle>
-            <a:lvl1pPr eaLnBrk="0" hangingPunct="0">
-              <a:spcBef>
-                <a:spcPct val="20000"/>
-              </a:spcBef>
-              <a:buChar char="•"/>
-              <a:defRPr sz="3200">
-                <a:solidFill>
-                  <a:schemeClr val="tx1"/>
-                </a:solidFill>
-                <a:latin typeface="Times New Roman" pitchFamily="18" charset="0"/>
-              </a:defRPr>
-            </a:lvl1pPr>
-            <a:lvl2pPr marL="742950" indent="-285750" eaLnBrk="0" hangingPunct="0">
-              <a:spcBef>
-                <a:spcPct val="20000"/>
-              </a:spcBef>
-              <a:buChar char="–"/>
-              <a:defRPr sz="2800">
-                <a:solidFill>
-                  <a:schemeClr val="tx1"/>
-                </a:solidFill>
-                <a:latin typeface="Times New Roman" pitchFamily="18" charset="0"/>
-              </a:defRPr>
-            </a:lvl2pPr>
-            <a:lvl3pPr marL="1143000" indent="-228600" eaLnBrk="0" hangingPunct="0">
-              <a:spcBef>
-                <a:spcPct val="20000"/>
-              </a:spcBef>
-              <a:buChar char="•"/>
-              <a:defRPr sz="2400">
-                <a:solidFill>
-                  <a:schemeClr val="tx1"/>
-                </a:solidFill>
-                <a:latin typeface="Times New Roman" pitchFamily="18" charset="0"/>
-              </a:defRPr>
-            </a:lvl3pPr>
-            <a:lvl4pPr marL="1600200" indent="-228600" eaLnBrk="0" hangingPunct="0">
-              <a:spcBef>
-                <a:spcPct val="20000"/>
-              </a:spcBef>
-              <a:buChar char="–"/>
-              <a:defRPr sz="2000">
-                <a:solidFill>
-                  <a:schemeClr val="tx1"/>
-                </a:solidFill>
-                <a:latin typeface="Times New Roman" pitchFamily="18" charset="0"/>
-              </a:defRPr>
-            </a:lvl4pPr>
-            <a:lvl5pPr marL="2057400" indent="-228600" eaLnBrk="0" hangingPunct="0">
-              <a:spcBef>
-                <a:spcPct val="20000"/>
-              </a:spcBef>
-              <a:buChar char="»"/>
-              <a:defRPr sz="2000">
-                <a:solidFill>
-                  <a:schemeClr val="tx1"/>
-                </a:solidFill>
-                <a:latin typeface="Times New Roman" pitchFamily="18" charset="0"/>
-              </a:defRPr>
-            </a:lvl5pPr>
-            <a:lvl6pPr marL="2514600" indent="-228600" eaLnBrk="0" fontAlgn="base" hangingPunct="0">
-              <a:spcBef>
-                <a:spcPct val="20000"/>
-              </a:spcBef>
-              <a:spcAft>
-                <a:spcPct val="0"/>
-              </a:spcAft>
-              <a:buChar char="»"/>
-              <a:defRPr sz="2000">
-                <a:solidFill>
-                  <a:schemeClr val="tx1"/>
-                </a:solidFill>
-                <a:latin typeface="Times New Roman" pitchFamily="18" charset="0"/>
-              </a:defRPr>
-            </a:lvl6pPr>
-            <a:lvl7pPr marL="2971800" indent="-228600" eaLnBrk="0" fontAlgn="base" hangingPunct="0">
-              <a:spcBef>
-                <a:spcPct val="20000"/>
-              </a:spcBef>
-              <a:spcAft>
-                <a:spcPct val="0"/>
-              </a:spcAft>
-              <a:buChar char="»"/>
-              <a:defRPr sz="2000">
-                <a:solidFill>
-                  <a:schemeClr val="tx1"/>
-                </a:solidFill>
-                <a:latin typeface="Times New Roman" pitchFamily="18" charset="0"/>
-              </a:defRPr>
-            </a:lvl7pPr>
-            <a:lvl8pPr marL="3429000" indent="-228600" eaLnBrk="0" fontAlgn="base" hangingPunct="0">
-              <a:spcBef>
-                <a:spcPct val="20000"/>
-              </a:spcBef>
-              <a:spcAft>
-                <a:spcPct val="0"/>
-              </a:spcAft>
-              <a:buChar char="»"/>
-              <a:defRPr sz="2000">
-                <a:solidFill>
-                  <a:schemeClr val="tx1"/>
-                </a:solidFill>
-                <a:latin typeface="Times New Roman" pitchFamily="18" charset="0"/>
-              </a:defRPr>
-            </a:lvl8pPr>
-            <a:lvl9pPr marL="3886200" indent="-228600" eaLnBrk="0" fontAlgn="base" hangingPunct="0">
-              <a:spcBef>
-                <a:spcPct val="20000"/>
-              </a:spcBef>
-              <a:spcAft>
-                <a:spcPct val="0"/>
-              </a:spcAft>
-              <a:buChar char="»"/>
-              <a:defRPr sz="2000">
-                <a:solidFill>
-                  <a:schemeClr val="tx1"/>
-                </a:solidFill>
-                <a:latin typeface="Times New Roman" pitchFamily="18" charset="0"/>
-              </a:defRPr>
-            </a:lvl9pPr>
-          </a:lstStyle>
-          <a:p>
-            <a:pPr algn="ctr" eaLnBrk="1" hangingPunct="1">
-              <a:spcBef>
-                <a:spcPct val="0"/>
-              </a:spcBef>
-              <a:buFontTx/>
-              <a:buNone/>
-            </a:pPr>
-            <a:r>
-              <a:rPr lang="en-US" altLang="en-US" sz="1200" dirty="0" smtClean="0">
-                <a:solidFill>
-                  <a:prstClr val="black"/>
-                </a:solidFill>
-                <a:latin typeface="Calibri" pitchFamily="34" charset="0"/>
-                <a:cs typeface="Calibri" pitchFamily="34" charset="0"/>
-              </a:rPr>
-              <a:t>ServiceA</a:t>
-            </a:r>
-            <a:endParaRPr lang="en-US" altLang="en-US" sz="1200" dirty="0">
-              <a:solidFill>
-                <a:prstClr val="black"/>
-              </a:solidFill>
-              <a:latin typeface="Calibri" pitchFamily="34" charset="0"/>
-              <a:cs typeface="Calibri" pitchFamily="34" charset="0"/>
-            </a:endParaRPr>
-          </a:p>
-        </p:txBody>
-      </p:sp>
-      <p:sp>
-        <p:nvSpPr>
-          <p:cNvPr id="11" name="Rectangle 12"/>
-          <p:cNvSpPr>
-            <a:spLocks noChangeArrowheads="1"/>
-          </p:cNvSpPr>
-          <p:nvPr/>
-        </p:nvSpPr>
-        <p:spPr bwMode="auto">
-          <a:xfrm>
-            <a:off x="3523296" y="4495800"/>
-            <a:ext cx="923925" cy="520700"/>
-          </a:xfrm>
-          <a:prstGeom prst="rect">
-            <a:avLst/>
-          </a:prstGeom>
-          <a:solidFill>
-            <a:srgbClr val="FF99FF"/>
-          </a:solidFill>
-          <a:ln w="9525">
-            <a:solidFill>
-              <a:schemeClr val="tx1"/>
-            </a:solidFill>
-            <a:miter lim="800000"/>
-            <a:headEnd/>
-            <a:tailEnd/>
-          </a:ln>
-        </p:spPr>
-        <p:txBody>
-          <a:bodyPr wrap="none" anchor="ctr"/>
-          <a:lstStyle>
-            <a:lvl1pPr eaLnBrk="0" hangingPunct="0">
-              <a:spcBef>
-                <a:spcPct val="20000"/>
-              </a:spcBef>
-              <a:buChar char="•"/>
-              <a:defRPr sz="3200">
-                <a:solidFill>
-                  <a:schemeClr val="tx1"/>
-                </a:solidFill>
-                <a:latin typeface="Times New Roman" pitchFamily="18" charset="0"/>
-              </a:defRPr>
-            </a:lvl1pPr>
-            <a:lvl2pPr marL="742950" indent="-285750" eaLnBrk="0" hangingPunct="0">
-              <a:spcBef>
-                <a:spcPct val="20000"/>
-              </a:spcBef>
-              <a:buChar char="–"/>
-              <a:defRPr sz="2800">
-                <a:solidFill>
-                  <a:schemeClr val="tx1"/>
-                </a:solidFill>
-                <a:latin typeface="Times New Roman" pitchFamily="18" charset="0"/>
-              </a:defRPr>
-            </a:lvl2pPr>
-            <a:lvl3pPr marL="1143000" indent="-228600" eaLnBrk="0" hangingPunct="0">
-              <a:spcBef>
-                <a:spcPct val="20000"/>
-              </a:spcBef>
-              <a:buChar char="•"/>
-              <a:defRPr sz="2400">
-                <a:solidFill>
-                  <a:schemeClr val="tx1"/>
-                </a:solidFill>
-                <a:latin typeface="Times New Roman" pitchFamily="18" charset="0"/>
-              </a:defRPr>
-            </a:lvl3pPr>
-            <a:lvl4pPr marL="1600200" indent="-228600" eaLnBrk="0" hangingPunct="0">
-              <a:spcBef>
-                <a:spcPct val="20000"/>
-              </a:spcBef>
-              <a:buChar char="–"/>
-              <a:defRPr sz="2000">
-                <a:solidFill>
-                  <a:schemeClr val="tx1"/>
-                </a:solidFill>
-                <a:latin typeface="Times New Roman" pitchFamily="18" charset="0"/>
-              </a:defRPr>
-            </a:lvl4pPr>
-            <a:lvl5pPr marL="2057400" indent="-228600" eaLnBrk="0" hangingPunct="0">
-              <a:spcBef>
-                <a:spcPct val="20000"/>
-              </a:spcBef>
-              <a:buChar char="»"/>
-              <a:defRPr sz="2000">
-                <a:solidFill>
-                  <a:schemeClr val="tx1"/>
-                </a:solidFill>
-                <a:latin typeface="Times New Roman" pitchFamily="18" charset="0"/>
-              </a:defRPr>
-            </a:lvl5pPr>
-            <a:lvl6pPr marL="2514600" indent="-228600" eaLnBrk="0" fontAlgn="base" hangingPunct="0">
-              <a:spcBef>
-                <a:spcPct val="20000"/>
-              </a:spcBef>
-              <a:spcAft>
-                <a:spcPct val="0"/>
-              </a:spcAft>
-              <a:buChar char="»"/>
-              <a:defRPr sz="2000">
-                <a:solidFill>
-                  <a:schemeClr val="tx1"/>
-                </a:solidFill>
-                <a:latin typeface="Times New Roman" pitchFamily="18" charset="0"/>
-              </a:defRPr>
-            </a:lvl6pPr>
-            <a:lvl7pPr marL="2971800" indent="-228600" eaLnBrk="0" fontAlgn="base" hangingPunct="0">
-              <a:spcBef>
-                <a:spcPct val="20000"/>
-              </a:spcBef>
-              <a:spcAft>
-                <a:spcPct val="0"/>
-              </a:spcAft>
-              <a:buChar char="»"/>
-              <a:defRPr sz="2000">
-                <a:solidFill>
-                  <a:schemeClr val="tx1"/>
-                </a:solidFill>
-                <a:latin typeface="Times New Roman" pitchFamily="18" charset="0"/>
-              </a:defRPr>
-            </a:lvl7pPr>
-            <a:lvl8pPr marL="3429000" indent="-228600" eaLnBrk="0" fontAlgn="base" hangingPunct="0">
-              <a:spcBef>
-                <a:spcPct val="20000"/>
-              </a:spcBef>
-              <a:spcAft>
-                <a:spcPct val="0"/>
-              </a:spcAft>
-              <a:buChar char="»"/>
-              <a:defRPr sz="2000">
-                <a:solidFill>
-                  <a:schemeClr val="tx1"/>
-                </a:solidFill>
-                <a:latin typeface="Times New Roman" pitchFamily="18" charset="0"/>
-              </a:defRPr>
-            </a:lvl8pPr>
-            <a:lvl9pPr marL="3886200" indent="-228600" eaLnBrk="0" fontAlgn="base" hangingPunct="0">
-              <a:spcBef>
-                <a:spcPct val="20000"/>
-              </a:spcBef>
-              <a:spcAft>
-                <a:spcPct val="0"/>
-              </a:spcAft>
-              <a:buChar char="»"/>
-              <a:defRPr sz="2000">
-                <a:solidFill>
-                  <a:schemeClr val="tx1"/>
-                </a:solidFill>
-                <a:latin typeface="Times New Roman" pitchFamily="18" charset="0"/>
-              </a:defRPr>
-            </a:lvl9pPr>
-          </a:lstStyle>
-          <a:p>
-            <a:pPr algn="ctr" eaLnBrk="1" hangingPunct="1">
-              <a:spcBef>
-                <a:spcPct val="0"/>
-              </a:spcBef>
-              <a:buFontTx/>
-              <a:buNone/>
-            </a:pPr>
-            <a:r>
-              <a:rPr lang="en-US" altLang="en-US" sz="1200" dirty="0">
-                <a:solidFill>
-                  <a:prstClr val="black"/>
-                </a:solidFill>
-                <a:latin typeface="Calibri" pitchFamily="34" charset="0"/>
-                <a:cs typeface="Calibri" pitchFamily="34" charset="0"/>
-              </a:rPr>
-              <a:t>Dapr </a:t>
-            </a:r>
-            <a:r>
-              <a:rPr lang="en-US" altLang="en-US" sz="1200" dirty="0" smtClean="0">
-                <a:solidFill>
-                  <a:prstClr val="black"/>
-                </a:solidFill>
-                <a:latin typeface="Calibri" pitchFamily="34" charset="0"/>
-                <a:cs typeface="Calibri" pitchFamily="34" charset="0"/>
-              </a:rPr>
-              <a:t>Sidecar</a:t>
-            </a:r>
-          </a:p>
-          <a:p>
-            <a:pPr algn="ctr" eaLnBrk="1" hangingPunct="1">
-              <a:spcBef>
-                <a:spcPct val="0"/>
-              </a:spcBef>
-              <a:buFontTx/>
-              <a:buNone/>
-            </a:pPr>
-            <a:r>
-              <a:rPr lang="en-US" altLang="en-US" sz="1200" dirty="0" smtClean="0">
-                <a:solidFill>
-                  <a:prstClr val="black"/>
-                </a:solidFill>
-                <a:latin typeface="Calibri" pitchFamily="34" charset="0"/>
-                <a:cs typeface="Calibri" pitchFamily="34" charset="0"/>
-              </a:rPr>
-              <a:t> for ServiceA</a:t>
-            </a:r>
-            <a:endParaRPr lang="en-US" altLang="en-US" sz="1200" dirty="0">
-              <a:solidFill>
-                <a:prstClr val="black"/>
-              </a:solidFill>
-              <a:latin typeface="Calibri" pitchFamily="34" charset="0"/>
-              <a:cs typeface="Calibri" pitchFamily="34" charset="0"/>
-            </a:endParaRPr>
-          </a:p>
-        </p:txBody>
-      </p:sp>
-      <p:cxnSp>
-        <p:nvCxnSpPr>
-          <p:cNvPr id="8" name="Straight Arrow Connector 7"/>
-          <p:cNvCxnSpPr>
-            <a:endCxn id="12" idx="1"/>
-          </p:cNvCxnSpPr>
-          <p:nvPr/>
-        </p:nvCxnSpPr>
-        <p:spPr>
-          <a:xfrm>
-            <a:off x="2679379" y="2546350"/>
-            <a:ext cx="828675" cy="0"/>
-          </a:xfrm>
-          <a:prstGeom prst="straightConnector1">
-            <a:avLst/>
-          </a:prstGeom>
-          <a:ln w="19050">
-            <a:solidFill>
-              <a:schemeClr val="tx1"/>
-            </a:solidFill>
-            <a:tailEnd type="arrow"/>
-          </a:ln>
-        </p:spPr>
-        <p:style>
-          <a:lnRef idx="1">
-            <a:schemeClr val="accent1"/>
-          </a:lnRef>
-          <a:fillRef idx="0">
-            <a:schemeClr val="accent1"/>
-          </a:fillRef>
-          <a:effectRef idx="0">
-            <a:schemeClr val="accent1"/>
-          </a:effectRef>
-          <a:fontRef idx="minor">
-            <a:schemeClr val="tx1"/>
-          </a:fontRef>
-        </p:style>
-      </p:cxnSp>
-      <p:cxnSp>
-        <p:nvCxnSpPr>
-          <p:cNvPr id="9" name="Straight Arrow Connector 8"/>
-          <p:cNvCxnSpPr/>
-          <p:nvPr/>
-        </p:nvCxnSpPr>
-        <p:spPr>
-          <a:xfrm>
-            <a:off x="6400800" y="3200400"/>
-            <a:ext cx="0" cy="1081405"/>
-          </a:xfrm>
-          <a:prstGeom prst="straightConnector1">
-            <a:avLst/>
-          </a:prstGeom>
-          <a:ln w="19050">
-            <a:solidFill>
-              <a:schemeClr val="tx1"/>
-            </a:solidFill>
-            <a:tailEnd type="arrow"/>
-          </a:ln>
-        </p:spPr>
-        <p:style>
-          <a:lnRef idx="1">
-            <a:schemeClr val="accent1"/>
-          </a:lnRef>
-          <a:fillRef idx="0">
-            <a:schemeClr val="accent1"/>
-          </a:fillRef>
-          <a:effectRef idx="0">
-            <a:schemeClr val="accent1"/>
-          </a:effectRef>
-          <a:fontRef idx="minor">
-            <a:schemeClr val="tx1"/>
-          </a:fontRef>
-        </p:style>
-      </p:cxnSp>
-    </p:spTree>
-    <p:extLst>
-      <p:ext uri="{BB962C8B-B14F-4D97-AF65-F5344CB8AC3E}">
-        <p14:creationId xmlns:p14="http://schemas.microsoft.com/office/powerpoint/2010/main" val="865066645"/>
       </p:ext>
     </p:extLst>
   </p:cSld>

</xml_diff>

<commit_message>
Added double headed arrows to mDNS box in the detailed call chain diagram to conform with Dapr Docs diagram.
</commit_message>
<xml_diff>
--- a/dapr-proxy-service-invocation/Using the Dapr Proxy for Service Invocation.pptx
+++ b/dapr-proxy-service-invocation/Using the Dapr Proxy for Service Invocation.pptx
@@ -322,7 +322,7 @@
           <a:p>
             <a:fld id="{CFC37855-D03C-49F4-B68F-729DF42794A3}" type="datetimeFigureOut">
               <a:rPr lang="en-US" smtClean="0"/>
-              <a:t>1/3/2023</a:t>
+              <a:t>1/6/2023</a:t>
             </a:fld>
             <a:endParaRPr lang="en-US"/>
           </a:p>
@@ -675,7 +675,7 @@
           <a:p>
             <a:fld id="{CFC37855-D03C-49F4-B68F-729DF42794A3}" type="datetimeFigureOut">
               <a:rPr lang="en-US" smtClean="0"/>
-              <a:t>1/3/2023</a:t>
+              <a:t>1/6/2023</a:t>
             </a:fld>
             <a:endParaRPr lang="en-US"/>
           </a:p>
@@ -850,7 +850,7 @@
           <a:p>
             <a:fld id="{CFC37855-D03C-49F4-B68F-729DF42794A3}" type="datetimeFigureOut">
               <a:rPr lang="en-US" smtClean="0"/>
-              <a:t>1/3/2023</a:t>
+              <a:t>1/6/2023</a:t>
             </a:fld>
             <a:endParaRPr lang="en-US"/>
           </a:p>
@@ -963,7 +963,7 @@
           <a:p>
             <a:fld id="{CFC37855-D03C-49F4-B68F-729DF42794A3}" type="datetimeFigureOut">
               <a:rPr lang="en-US" smtClean="0"/>
-              <a:t>1/3/2023</a:t>
+              <a:t>1/6/2023</a:t>
             </a:fld>
             <a:endParaRPr lang="en-US"/>
           </a:p>
@@ -1321,7 +1321,7 @@
           <a:p>
             <a:fld id="{CFC37855-D03C-49F4-B68F-729DF42794A3}" type="datetimeFigureOut">
               <a:rPr lang="en-US" smtClean="0"/>
-              <a:t>1/3/2023</a:t>
+              <a:t>1/6/2023</a:t>
             </a:fld>
             <a:endParaRPr lang="en-US"/>
           </a:p>
@@ -1586,7 +1586,7 @@
           <a:p>
             <a:fld id="{CFC37855-D03C-49F4-B68F-729DF42794A3}" type="datetimeFigureOut">
               <a:rPr lang="en-US" smtClean="0"/>
-              <a:t>1/3/2023</a:t>
+              <a:t>1/6/2023</a:t>
             </a:fld>
             <a:endParaRPr lang="en-US"/>
           </a:p>
@@ -1948,7 +1948,7 @@
           <a:p>
             <a:fld id="{CFC37855-D03C-49F4-B68F-729DF42794A3}" type="datetimeFigureOut">
               <a:rPr lang="en-US" smtClean="0"/>
-              <a:t>1/3/2023</a:t>
+              <a:t>1/6/2023</a:t>
             </a:fld>
             <a:endParaRPr lang="en-US"/>
           </a:p>
@@ -2175,7 +2175,7 @@
           <a:p>
             <a:fld id="{CFC37855-D03C-49F4-B68F-729DF42794A3}" type="datetimeFigureOut">
               <a:rPr lang="en-US" smtClean="0"/>
-              <a:t>1/3/2023</a:t>
+              <a:t>1/6/2023</a:t>
             </a:fld>
             <a:endParaRPr lang="en-US"/>
           </a:p>
@@ -2265,7 +2265,7 @@
           <a:p>
             <a:fld id="{CFC37855-D03C-49F4-B68F-729DF42794A3}" type="datetimeFigureOut">
               <a:rPr lang="en-US" smtClean="0"/>
-              <a:t>1/3/2023</a:t>
+              <a:t>1/6/2023</a:t>
             </a:fld>
             <a:endParaRPr lang="en-US"/>
           </a:p>
@@ -2532,7 +2532,7 @@
           <a:p>
             <a:fld id="{CFC37855-D03C-49F4-B68F-729DF42794A3}" type="datetimeFigureOut">
               <a:rPr lang="en-US" smtClean="0"/>
-              <a:t>1/3/2023</a:t>
+              <a:t>1/6/2023</a:t>
             </a:fld>
             <a:endParaRPr lang="en-US"/>
           </a:p>
@@ -2760,7 +2760,7 @@
           <a:p>
             <a:fld id="{CFC37855-D03C-49F4-B68F-729DF42794A3}" type="datetimeFigureOut">
               <a:rPr lang="en-US" smtClean="0"/>
-              <a:t>1/3/2023</a:t>
+              <a:t>1/6/2023</a:t>
             </a:fld>
             <a:endParaRPr lang="en-US"/>
           </a:p>
@@ -3259,7 +3259,7 @@
           <a:p>
             <a:fld id="{CFC37855-D03C-49F4-B68F-729DF42794A3}" type="datetimeFigureOut">
               <a:rPr lang="en-US" smtClean="0"/>
-              <a:t>1/3/2023</a:t>
+              <a:t>1/6/2023</a:t>
             </a:fld>
             <a:endParaRPr lang="en-US"/>
           </a:p>
@@ -5656,11 +5656,7 @@
             </a:r>
             <a:r>
               <a:rPr lang="en-US" sz="1400" dirty="0" smtClean="0"/>
-              <a:t> </a:t>
-            </a:r>
-            <a:r>
-              <a:rPr lang="en-US" sz="1400" dirty="0" smtClean="0"/>
-              <a:t>folder to see how to use the below </a:t>
+              <a:t> folder to see how to use the below </a:t>
             </a:r>
             <a:r>
               <a:rPr lang="en-US" sz="1400" dirty="0" err="1" smtClean="0"/>
@@ -5919,20 +5915,20 @@
         <p:spPr>
           <a:xfrm>
             <a:off x="685800" y="152400"/>
-            <a:ext cx="7772400" cy="792162"/>
+            <a:ext cx="7772400" cy="609600"/>
           </a:xfrm>
         </p:spPr>
         <p:txBody>
           <a:bodyPr>
-            <a:normAutofit/>
+            <a:normAutofit fontScale="90000"/>
           </a:bodyPr>
           <a:lstStyle/>
           <a:p>
             <a:r>
-              <a:rPr lang="en-US" dirty="0" smtClean="0"/>
+              <a:rPr lang="en-US" sz="3600" dirty="0" smtClean="0"/>
               <a:t>Detailed View of the Call Chain</a:t>
             </a:r>
-            <a:endParaRPr lang="en-US" dirty="0"/>
+            <a:endParaRPr lang="en-US" sz="3600" dirty="0"/>
           </a:p>
         </p:txBody>
       </p:sp>
@@ -5948,8 +5944,8 @@
         </p:nvSpPr>
         <p:spPr>
           <a:xfrm>
-            <a:off x="685800" y="838200"/>
-            <a:ext cx="7772400" cy="5480848"/>
+            <a:off x="685800" y="685800"/>
+            <a:ext cx="7772400" cy="5633248"/>
           </a:xfrm>
         </p:spPr>
         <p:txBody>
@@ -5959,9 +5955,25 @@
           <a:lstStyle/>
           <a:p>
             <a:r>
-              <a:rPr lang="en-US" sz="2400" dirty="0" smtClean="0"/>
-              <a:t>All of the ports and port names used in the Dapr Run commands are shown below.</a:t>
-            </a:r>
+              <a:rPr lang="en-US" sz="2000" dirty="0" smtClean="0"/>
+              <a:t>All of the ports and port names used in the Dapr Run commands are shown </a:t>
+            </a:r>
+            <a:r>
+              <a:rPr lang="en-US" sz="2000" dirty="0" smtClean="0"/>
+              <a:t>below</a:t>
+            </a:r>
+            <a:r>
+              <a:rPr lang="en-US" sz="2000" dirty="0"/>
+              <a:t>.</a:t>
+            </a:r>
+            <a:endParaRPr lang="en-US" sz="2000" dirty="0" smtClean="0"/>
+          </a:p>
+          <a:p>
+            <a:r>
+              <a:rPr lang="en-US" sz="2000" dirty="0" smtClean="0"/>
+              <a:t>This diagram shows Self Hosted mode as used in the code example.</a:t>
+            </a:r>
+            <a:endParaRPr lang="en-US" sz="2000" dirty="0" smtClean="0"/>
           </a:p>
           <a:p>
             <a:pPr marL="0" indent="0">
@@ -5981,7 +5993,7 @@
         </p:nvSpPr>
         <p:spPr bwMode="auto">
           <a:xfrm>
-            <a:off x="3508054" y="2286000"/>
+            <a:off x="3632833" y="2286000"/>
             <a:ext cx="923925" cy="520700"/>
           </a:xfrm>
           <a:prstGeom prst="rect">
@@ -6155,7 +6167,7 @@
         </p:nvSpPr>
         <p:spPr bwMode="auto">
           <a:xfrm>
-            <a:off x="3508052" y="3200400"/>
+            <a:off x="3632831" y="3200400"/>
             <a:ext cx="923925" cy="520700"/>
           </a:xfrm>
           <a:prstGeom prst="rect">
@@ -6345,7 +6357,7 @@
         </p:nvSpPr>
         <p:spPr bwMode="auto">
           <a:xfrm>
-            <a:off x="3523296" y="5615940"/>
+            <a:off x="3648075" y="5615940"/>
             <a:ext cx="923925" cy="520700"/>
           </a:xfrm>
           <a:prstGeom prst="rect">
@@ -6519,7 +6531,7 @@
         </p:nvSpPr>
         <p:spPr bwMode="auto">
           <a:xfrm>
-            <a:off x="3508051" y="4700270"/>
+            <a:off x="3632830" y="4700270"/>
             <a:ext cx="923925" cy="520700"/>
           </a:xfrm>
           <a:prstGeom prst="rect">
@@ -6716,7 +6728,7 @@
         </p:nvCxnSpPr>
         <p:spPr>
           <a:xfrm>
-            <a:off x="1859279" y="2543016"/>
+            <a:off x="1984058" y="2543016"/>
             <a:ext cx="1232513" cy="3335"/>
           </a:xfrm>
           <a:prstGeom prst="straightConnector1">
@@ -6755,7 +6767,7 @@
         </p:nvCxnSpPr>
         <p:spPr>
           <a:xfrm flipH="1">
-            <a:off x="3970014" y="3721100"/>
+            <a:off x="4094793" y="3721100"/>
             <a:ext cx="1" cy="979170"/>
           </a:xfrm>
           <a:prstGeom prst="straightConnector1">
@@ -6791,7 +6803,7 @@
         </p:nvSpPr>
         <p:spPr>
           <a:xfrm>
-            <a:off x="1905000" y="2624137"/>
+            <a:off x="2029779" y="2624137"/>
             <a:ext cx="1146810" cy="253916"/>
           </a:xfrm>
           <a:prstGeom prst="rect">
@@ -6821,7 +6833,7 @@
         </p:nvSpPr>
         <p:spPr>
           <a:xfrm>
-            <a:off x="2961320" y="2624137"/>
+            <a:off x="3086099" y="2624137"/>
             <a:ext cx="453392" cy="195263"/>
           </a:xfrm>
           <a:prstGeom prst="rect">
@@ -6885,7 +6897,7 @@
         </p:nvSpPr>
         <p:spPr bwMode="auto">
           <a:xfrm>
-            <a:off x="957579" y="2281872"/>
+            <a:off x="1082358" y="2281872"/>
             <a:ext cx="901700" cy="522288"/>
           </a:xfrm>
           <a:prstGeom prst="rect">
@@ -7039,7 +7051,7 @@
         </p:nvGrpSpPr>
         <p:grpSpPr>
           <a:xfrm rot="16200000">
-            <a:off x="3227047" y="3256915"/>
+            <a:off x="3351826" y="3256915"/>
             <a:ext cx="137160" cy="407670"/>
             <a:chOff x="2037396" y="3166110"/>
             <a:chExt cx="137160" cy="407670"/>
@@ -7137,7 +7149,7 @@
         </p:nvGrpSpPr>
         <p:grpSpPr>
           <a:xfrm rot="16200000">
-            <a:off x="3262301" y="4756785"/>
+            <a:off x="3387080" y="4756785"/>
             <a:ext cx="137160" cy="407670"/>
             <a:chOff x="2037396" y="3166110"/>
             <a:chExt cx="137160" cy="407670"/>
@@ -7235,7 +7247,7 @@
         </p:nvGrpSpPr>
         <p:grpSpPr>
           <a:xfrm rot="16200000">
-            <a:off x="3262301" y="5672455"/>
+            <a:off x="3387080" y="5672455"/>
             <a:ext cx="137160" cy="407670"/>
             <a:chOff x="2037396" y="3166110"/>
             <a:chExt cx="137160" cy="407670"/>
@@ -7333,7 +7345,7 @@
         </p:nvGrpSpPr>
         <p:grpSpPr>
           <a:xfrm rot="16200000">
-            <a:off x="3235637" y="2342515"/>
+            <a:off x="3360416" y="2342515"/>
             <a:ext cx="137160" cy="407670"/>
             <a:chOff x="2037396" y="3166110"/>
             <a:chExt cx="137160" cy="407670"/>
@@ -7431,7 +7443,7 @@
         </p:nvSpPr>
         <p:spPr>
           <a:xfrm>
-            <a:off x="1778317" y="3581400"/>
+            <a:off x="1903096" y="3581400"/>
             <a:ext cx="1152984" cy="415498"/>
           </a:xfrm>
           <a:prstGeom prst="rect">
@@ -7477,7 +7489,7 @@
         </p:nvSpPr>
         <p:spPr>
           <a:xfrm>
-            <a:off x="1528728" y="3212097"/>
+            <a:off x="1653507" y="3212097"/>
             <a:ext cx="1524000" cy="415498"/>
           </a:xfrm>
           <a:prstGeom prst="rect">
@@ -7507,7 +7519,7 @@
         </p:nvSpPr>
         <p:spPr>
           <a:xfrm>
-            <a:off x="2208836" y="2099102"/>
+            <a:off x="2333615" y="2099102"/>
             <a:ext cx="1190625" cy="415498"/>
           </a:xfrm>
           <a:prstGeom prst="rect">
@@ -7540,7 +7552,7 @@
         </p:nvCxnSpPr>
         <p:spPr>
           <a:xfrm rot="5400000">
-            <a:off x="3203880" y="2694613"/>
+            <a:off x="3328659" y="2694613"/>
             <a:ext cx="654050" cy="878225"/>
           </a:xfrm>
           <a:prstGeom prst="curvedConnector4">
@@ -7579,7 +7591,7 @@
         </p:nvSpPr>
         <p:spPr>
           <a:xfrm>
-            <a:off x="2868458" y="3581400"/>
+            <a:off x="2993237" y="3581400"/>
             <a:ext cx="601008" cy="227013"/>
           </a:xfrm>
           <a:prstGeom prst="rect">
@@ -7641,7 +7653,7 @@
         </p:nvSpPr>
         <p:spPr>
           <a:xfrm>
-            <a:off x="1763078" y="5067775"/>
+            <a:off x="1887857" y="5067775"/>
             <a:ext cx="1183462" cy="415498"/>
           </a:xfrm>
           <a:prstGeom prst="rect">
@@ -7687,7 +7699,7 @@
         </p:nvSpPr>
         <p:spPr>
           <a:xfrm>
-            <a:off x="1488262" y="4613702"/>
+            <a:off x="1613041" y="4613702"/>
             <a:ext cx="1640234" cy="415498"/>
           </a:xfrm>
           <a:prstGeom prst="rect">
@@ -7717,7 +7729,7 @@
         </p:nvSpPr>
         <p:spPr>
           <a:xfrm>
-            <a:off x="2892785" y="5075395"/>
+            <a:off x="3017564" y="5075395"/>
             <a:ext cx="536215" cy="227013"/>
           </a:xfrm>
           <a:prstGeom prst="rect">
@@ -7779,7 +7791,7 @@
         </p:nvSpPr>
         <p:spPr>
           <a:xfrm>
-            <a:off x="1828800" y="6065132"/>
+            <a:off x="1953579" y="6065132"/>
             <a:ext cx="1146810" cy="253916"/>
           </a:xfrm>
           <a:prstGeom prst="rect">
@@ -7809,7 +7821,7 @@
         </p:nvSpPr>
         <p:spPr>
           <a:xfrm>
-            <a:off x="1476375" y="5668540"/>
+            <a:off x="1601154" y="5668540"/>
             <a:ext cx="1190625" cy="415498"/>
           </a:xfrm>
           <a:prstGeom prst="rect">
@@ -7839,7 +7851,7 @@
         </p:nvSpPr>
         <p:spPr>
           <a:xfrm>
-            <a:off x="2931301" y="6078583"/>
+            <a:off x="3056080" y="6078583"/>
             <a:ext cx="567203" cy="227013"/>
           </a:xfrm>
           <a:prstGeom prst="rect">
@@ -7904,7 +7916,7 @@
         </p:nvCxnSpPr>
         <p:spPr>
           <a:xfrm rot="5400000">
-            <a:off x="3220870" y="5127146"/>
+            <a:off x="3345649" y="5127146"/>
             <a:ext cx="655320" cy="842968"/>
           </a:xfrm>
           <a:prstGeom prst="curvedConnector4">
@@ -7943,7 +7955,7 @@
         </p:nvSpPr>
         <p:spPr>
           <a:xfrm>
-            <a:off x="6019800" y="2156390"/>
+            <a:off x="5976936" y="2253714"/>
             <a:ext cx="2667000" cy="2123658"/>
           </a:xfrm>
           <a:prstGeom prst="rect">
@@ -8007,13 +8019,18 @@
         </p:nvSpPr>
         <p:spPr>
           <a:xfrm>
-            <a:off x="4114800" y="3841353"/>
-            <a:ext cx="1905000" cy="738664"/>
+            <a:off x="4249103" y="3934082"/>
+            <a:ext cx="1542097" cy="646331"/>
           </a:xfrm>
           <a:prstGeom prst="rect">
             <a:avLst/>
           </a:prstGeom>
           <a:noFill/>
+          <a:ln w="6350">
+            <a:solidFill>
+              <a:schemeClr val="tx1"/>
+            </a:solidFill>
+          </a:ln>
         </p:spPr>
         <p:txBody>
           <a:bodyPr wrap="square" rtlCol="0">
@@ -8022,10 +8039,18 @@
           <a:lstStyle/>
           <a:p>
             <a:r>
-              <a:rPr lang="en-US" sz="1050" dirty="0" smtClean="0"/>
-              <a:t>Dapr Sidecar interaction &amp; Dapr infrastructure details are omitted.  Please see Dapr Docs for that.</a:t>
-            </a:r>
-            <a:endParaRPr lang="en-US" sz="1050" dirty="0"/>
+              <a:rPr lang="en-US" sz="900" dirty="0" smtClean="0"/>
+              <a:t>Dapr </a:t>
+            </a:r>
+            <a:r>
+              <a:rPr lang="en-US" sz="900" dirty="0" smtClean="0"/>
+              <a:t>Sidecar </a:t>
+            </a:r>
+            <a:r>
+              <a:rPr lang="en-US" sz="900" dirty="0" smtClean="0"/>
+              <a:t>interaction &amp; Dapr infrastructure details are omitted.  Please see Dapr Docs for that.</a:t>
+            </a:r>
+            <a:endParaRPr lang="en-US" sz="900" dirty="0"/>
           </a:p>
         </p:txBody>
       </p:sp>
@@ -8039,7 +8064,7 @@
         </p:nvSpPr>
         <p:spPr bwMode="auto">
           <a:xfrm>
-            <a:off x="2292664" y="3996898"/>
+            <a:off x="2505075" y="3996898"/>
             <a:ext cx="923925" cy="520700"/>
           </a:xfrm>
           <a:prstGeom prst="rect">
@@ -8190,13 +8215,6 @@
               <a:buNone/>
             </a:pPr>
             <a:r>
-              <a:rPr lang="en-US" altLang="en-US" sz="1200" dirty="0" smtClean="0">
-                <a:latin typeface="Calibri" pitchFamily="34" charset="0"/>
-                <a:cs typeface="Calibri" pitchFamily="34" charset="0"/>
-              </a:rPr>
-              <a:t>Dapr </a:t>
-            </a:r>
-            <a:r>
               <a:rPr lang="en-US" altLang="en-US" sz="1200" b="1" dirty="0" err="1" smtClean="0">
                 <a:latin typeface="Calibri" pitchFamily="34" charset="0"/>
                 <a:cs typeface="Calibri" pitchFamily="34" charset="0"/>
@@ -8210,6 +8228,10 @@
               </a:rPr>
               <a:t> </a:t>
             </a:r>
+            <a:endParaRPr lang="en-US" altLang="en-US" sz="1200" dirty="0" smtClean="0">
+              <a:latin typeface="Calibri" pitchFamily="34" charset="0"/>
+              <a:cs typeface="Calibri" pitchFamily="34" charset="0"/>
+            </a:endParaRPr>
           </a:p>
           <a:p>
             <a:pPr algn="ctr" eaLnBrk="1" hangingPunct="1">
@@ -8260,8 +8282,8 @@
         </p:nvCxnSpPr>
         <p:spPr>
           <a:xfrm flipH="1">
-            <a:off x="3216589" y="3721100"/>
-            <a:ext cx="753426" cy="536148"/>
+            <a:off x="3429000" y="3721100"/>
+            <a:ext cx="665794" cy="536148"/>
           </a:xfrm>
           <a:prstGeom prst="straightConnector1">
             <a:avLst/>
@@ -8270,7 +8292,8 @@
             <a:solidFill>
               <a:schemeClr val="tx1"/>
             </a:solidFill>
-            <a:tailEnd type="arrow"/>
+            <a:headEnd type="triangle" w="med" len="med"/>
+            <a:tailEnd type="triangle" w="med" len="med"/>
           </a:ln>
         </p:spPr>
         <p:style>
@@ -8299,8 +8322,8 @@
         </p:nvCxnSpPr>
         <p:spPr>
           <a:xfrm flipH="1" flipV="1">
-            <a:off x="3216589" y="4257248"/>
-            <a:ext cx="753425" cy="443022"/>
+            <a:off x="3429000" y="4257248"/>
+            <a:ext cx="665793" cy="443022"/>
           </a:xfrm>
           <a:prstGeom prst="straightConnector1">
             <a:avLst/>
@@ -8309,7 +8332,87 @@
             <a:solidFill>
               <a:schemeClr val="tx1"/>
             </a:solidFill>
-            <a:tailEnd type="arrow"/>
+            <a:headEnd type="triangle" w="med" len="med"/>
+            <a:tailEnd type="triangle" w="med" len="med"/>
+          </a:ln>
+        </p:spPr>
+        <p:style>
+          <a:lnRef idx="1">
+            <a:schemeClr val="accent1"/>
+          </a:lnRef>
+          <a:fillRef idx="0">
+            <a:schemeClr val="accent1"/>
+          </a:fillRef>
+          <a:effectRef idx="0">
+            <a:schemeClr val="accent1"/>
+          </a:effectRef>
+          <a:fontRef idx="minor">
+            <a:schemeClr val="tx1"/>
+          </a:fontRef>
+        </p:style>
+      </p:cxnSp>
+      <p:sp>
+        <p:nvSpPr>
+          <p:cNvPr id="50" name="TextBox 49"/>
+          <p:cNvSpPr txBox="1"/>
+          <p:nvPr/>
+        </p:nvSpPr>
+        <p:spPr>
+          <a:xfrm>
+            <a:off x="609600" y="3956882"/>
+            <a:ext cx="1524000" cy="646331"/>
+          </a:xfrm>
+          <a:prstGeom prst="rect">
+            <a:avLst/>
+          </a:prstGeom>
+          <a:noFill/>
+          <a:ln w="6350">
+            <a:solidFill>
+              <a:schemeClr val="tx1"/>
+            </a:solidFill>
+          </a:ln>
+        </p:spPr>
+        <p:txBody>
+          <a:bodyPr wrap="square" rtlCol="0">
+            <a:spAutoFit/>
+          </a:bodyPr>
+          <a:lstStyle/>
+          <a:p>
+            <a:r>
+              <a:rPr lang="en-US" sz="900" dirty="0" err="1" smtClean="0"/>
+              <a:t>mDNS</a:t>
+            </a:r>
+            <a:r>
+              <a:rPr lang="en-US" sz="900" dirty="0" smtClean="0"/>
+              <a:t> (multicast DNS) is used in Self Hosted mode.  Kubernetes DNS is used when hosted on K8s.</a:t>
+            </a:r>
+            <a:endParaRPr lang="en-US" sz="900" dirty="0"/>
+          </a:p>
+        </p:txBody>
+      </p:sp>
+      <p:cxnSp>
+        <p:nvCxnSpPr>
+          <p:cNvPr id="51" name="Straight Connector 50"/>
+          <p:cNvCxnSpPr>
+            <a:stCxn id="42" idx="1"/>
+            <a:endCxn id="50" idx="3"/>
+          </p:cNvCxnSpPr>
+          <p:nvPr/>
+        </p:nvCxnSpPr>
+        <p:spPr>
+          <a:xfrm flipH="1">
+            <a:off x="2133600" y="4257248"/>
+            <a:ext cx="371475" cy="22800"/>
+          </a:xfrm>
+          <a:prstGeom prst="line">
+            <a:avLst/>
+          </a:prstGeom>
+          <a:ln>
+            <a:solidFill>
+              <a:schemeClr val="tx1"/>
+            </a:solidFill>
+            <a:prstDash val="dashDot"/>
+            <a:tailEnd type="oval"/>
           </a:ln>
         </p:spPr>
         <p:style>
@@ -8497,9 +8600,36 @@
               <a:rPr lang="en-US" sz="1600" dirty="0">
                 <a:hlinkClick r:id="rId5"/>
               </a:rPr>
-              <a:t>https://docs.dapr.io/concepts/overview/</a:t>
-            </a:r>
-            <a:endParaRPr lang="en-US" sz="1600" dirty="0"/>
+              <a:t>https://docs.dapr.io/concepts/overview</a:t>
+            </a:r>
+            <a:r>
+              <a:rPr lang="en-US" sz="1600" dirty="0" smtClean="0">
+                <a:hlinkClick r:id="rId5"/>
+              </a:rPr>
+              <a:t>/</a:t>
+            </a:r>
+            <a:endParaRPr lang="en-US" sz="1600" dirty="0" smtClean="0"/>
+          </a:p>
+          <a:p>
+            <a:r>
+              <a:rPr lang="en-US" sz="1800" dirty="0" err="1" smtClean="0"/>
+              <a:t>mDNS</a:t>
+            </a:r>
+            <a:r>
+              <a:rPr lang="en-US" sz="1800" dirty="0"/>
+              <a:t> </a:t>
+            </a:r>
+            <a:r>
+              <a:rPr lang="en-US" sz="1800" dirty="0" smtClean="0"/>
+              <a:t>explanation: </a:t>
+            </a:r>
+            <a:r>
+              <a:rPr lang="en-US" sz="1800" dirty="0">
+                <a:hlinkClick r:id="rId6"/>
+              </a:rPr>
+              <a:t>https://en.wikipedia.org/wiki/Multicast_DNS</a:t>
+            </a:r>
+            <a:endParaRPr lang="en-US" sz="1800" dirty="0"/>
           </a:p>
         </p:txBody>
       </p:sp>

</xml_diff>

<commit_message>
Correcteda typo on the chart showing the details of the connections between services and sidecars.  Changed 50001 to 50002.
</commit_message>
<xml_diff>
--- a/dapr-proxy-service-invocation/Using the Dapr Proxy for Service Invocation.pptx
+++ b/dapr-proxy-service-invocation/Using the Dapr Proxy for Service Invocation.pptx
@@ -322,7 +322,7 @@
           <a:p>
             <a:fld id="{CFC37855-D03C-49F4-B68F-729DF42794A3}" type="datetimeFigureOut">
               <a:rPr lang="en-US" smtClean="0"/>
-              <a:t>1/6/2023</a:t>
+              <a:t>2/2/2023</a:t>
             </a:fld>
             <a:endParaRPr lang="en-US"/>
           </a:p>
@@ -675,7 +675,7 @@
           <a:p>
             <a:fld id="{CFC37855-D03C-49F4-B68F-729DF42794A3}" type="datetimeFigureOut">
               <a:rPr lang="en-US" smtClean="0"/>
-              <a:t>1/6/2023</a:t>
+              <a:t>2/2/2023</a:t>
             </a:fld>
             <a:endParaRPr lang="en-US"/>
           </a:p>
@@ -850,7 +850,7 @@
           <a:p>
             <a:fld id="{CFC37855-D03C-49F4-B68F-729DF42794A3}" type="datetimeFigureOut">
               <a:rPr lang="en-US" smtClean="0"/>
-              <a:t>1/6/2023</a:t>
+              <a:t>2/2/2023</a:t>
             </a:fld>
             <a:endParaRPr lang="en-US"/>
           </a:p>
@@ -963,7 +963,7 @@
           <a:p>
             <a:fld id="{CFC37855-D03C-49F4-B68F-729DF42794A3}" type="datetimeFigureOut">
               <a:rPr lang="en-US" smtClean="0"/>
-              <a:t>1/6/2023</a:t>
+              <a:t>2/2/2023</a:t>
             </a:fld>
             <a:endParaRPr lang="en-US"/>
           </a:p>
@@ -1321,7 +1321,7 @@
           <a:p>
             <a:fld id="{CFC37855-D03C-49F4-B68F-729DF42794A3}" type="datetimeFigureOut">
               <a:rPr lang="en-US" smtClean="0"/>
-              <a:t>1/6/2023</a:t>
+              <a:t>2/2/2023</a:t>
             </a:fld>
             <a:endParaRPr lang="en-US"/>
           </a:p>
@@ -1586,7 +1586,7 @@
           <a:p>
             <a:fld id="{CFC37855-D03C-49F4-B68F-729DF42794A3}" type="datetimeFigureOut">
               <a:rPr lang="en-US" smtClean="0"/>
-              <a:t>1/6/2023</a:t>
+              <a:t>2/2/2023</a:t>
             </a:fld>
             <a:endParaRPr lang="en-US"/>
           </a:p>
@@ -1948,7 +1948,7 @@
           <a:p>
             <a:fld id="{CFC37855-D03C-49F4-B68F-729DF42794A3}" type="datetimeFigureOut">
               <a:rPr lang="en-US" smtClean="0"/>
-              <a:t>1/6/2023</a:t>
+              <a:t>2/2/2023</a:t>
             </a:fld>
             <a:endParaRPr lang="en-US"/>
           </a:p>
@@ -2175,7 +2175,7 @@
           <a:p>
             <a:fld id="{CFC37855-D03C-49F4-B68F-729DF42794A3}" type="datetimeFigureOut">
               <a:rPr lang="en-US" smtClean="0"/>
-              <a:t>1/6/2023</a:t>
+              <a:t>2/2/2023</a:t>
             </a:fld>
             <a:endParaRPr lang="en-US"/>
           </a:p>
@@ -2265,7 +2265,7 @@
           <a:p>
             <a:fld id="{CFC37855-D03C-49F4-B68F-729DF42794A3}" type="datetimeFigureOut">
               <a:rPr lang="en-US" smtClean="0"/>
-              <a:t>1/6/2023</a:t>
+              <a:t>2/2/2023</a:t>
             </a:fld>
             <a:endParaRPr lang="en-US"/>
           </a:p>
@@ -2532,7 +2532,7 @@
           <a:p>
             <a:fld id="{CFC37855-D03C-49F4-B68F-729DF42794A3}" type="datetimeFigureOut">
               <a:rPr lang="en-US" smtClean="0"/>
-              <a:t>1/6/2023</a:t>
+              <a:t>2/2/2023</a:t>
             </a:fld>
             <a:endParaRPr lang="en-US"/>
           </a:p>
@@ -2760,7 +2760,7 @@
           <a:p>
             <a:fld id="{CFC37855-D03C-49F4-B68F-729DF42794A3}" type="datetimeFigureOut">
               <a:rPr lang="en-US" smtClean="0"/>
-              <a:t>1/6/2023</a:t>
+              <a:t>2/2/2023</a:t>
             </a:fld>
             <a:endParaRPr lang="en-US"/>
           </a:p>
@@ -3259,7 +3259,7 @@
           <a:p>
             <a:fld id="{CFC37855-D03C-49F4-B68F-729DF42794A3}" type="datetimeFigureOut">
               <a:rPr lang="en-US" smtClean="0"/>
-              <a:t>1/6/2023</a:t>
+              <a:t>2/2/2023</a:t>
             </a:fld>
             <a:endParaRPr lang="en-US"/>
           </a:p>
@@ -5956,11 +5956,7 @@
           <a:p>
             <a:r>
               <a:rPr lang="en-US" sz="2000" dirty="0" smtClean="0"/>
-              <a:t>All of the ports and port names used in the Dapr Run commands are shown </a:t>
-            </a:r>
-            <a:r>
-              <a:rPr lang="en-US" sz="2000" dirty="0" smtClean="0"/>
-              <a:t>below</a:t>
+              <a:t>All of the ports and port names used in the Dapr Run commands are shown below</a:t>
             </a:r>
             <a:r>
               <a:rPr lang="en-US" sz="2000" dirty="0"/>
@@ -5973,7 +5969,6 @@
               <a:rPr lang="en-US" sz="2000" dirty="0" smtClean="0"/>
               <a:t>This diagram shows Self Hosted mode as used in the code example.</a:t>
             </a:r>
-            <a:endParaRPr lang="en-US" sz="2000" dirty="0" smtClean="0"/>
           </a:p>
           <a:p>
             <a:pPr marL="0" indent="0">
@@ -7685,7 +7680,11 @@
             </a:r>
             <a:r>
               <a:rPr lang="en-US" sz="1050" dirty="0" smtClean="0"/>
-              <a:t>-port 50001</a:t>
+              <a:t>-port </a:t>
+            </a:r>
+            <a:r>
+              <a:rPr lang="en-US" sz="1050" dirty="0" smtClean="0"/>
+              <a:t>50002</a:t>
             </a:r>
             <a:endParaRPr lang="en-US" sz="1050" dirty="0"/>
           </a:p>
@@ -8040,15 +8039,7 @@
           <a:p>
             <a:r>
               <a:rPr lang="en-US" sz="900" dirty="0" smtClean="0"/>
-              <a:t>Dapr </a:t>
-            </a:r>
-            <a:r>
-              <a:rPr lang="en-US" sz="900" dirty="0" smtClean="0"/>
-              <a:t>Sidecar </a:t>
-            </a:r>
-            <a:r>
-              <a:rPr lang="en-US" sz="900" dirty="0" smtClean="0"/>
-              <a:t>interaction &amp; Dapr infrastructure details are omitted.  Please see Dapr Docs for that.</a:t>
+              <a:t>Dapr Sidecar interaction &amp; Dapr infrastructure details are omitted.  Please see Dapr Docs for that.</a:t>
             </a:r>
             <a:endParaRPr lang="en-US" sz="900" dirty="0"/>
           </a:p>
@@ -8228,10 +8219,6 @@
               </a:rPr>
               <a:t> </a:t>
             </a:r>
-            <a:endParaRPr lang="en-US" altLang="en-US" sz="1200" dirty="0" smtClean="0">
-              <a:latin typeface="Calibri" pitchFamily="34" charset="0"/>
-              <a:cs typeface="Calibri" pitchFamily="34" charset="0"/>
-            </a:endParaRPr>
           </a:p>
           <a:p>
             <a:pPr algn="ctr" eaLnBrk="1" hangingPunct="1">

</xml_diff>